<commit_message>
Polishing descriptions in Encryption.rst #1106
(cherry picked from commit b0bac9506d602ce95b94f547e5773e7aed5cdadf)
</commit_message>
<xml_diff>
--- a/source/Security/images_Encryption/Encryption.pptx
+++ b/source/Security/images_Encryption/Encryption.pptx
@@ -6,8 +6,6 @@
   </p:sldMasterIdLst>
   <p:sldIdLst>
     <p:sldId id="259" r:id="rId2"/>
-    <p:sldId id="258" r:id="rId3"/>
-    <p:sldId id="257" r:id="rId4"/>
   </p:sldIdLst>
   <p:sldSz cx="9144000" cy="6858000" type="screen4x3"/>
   <p:notesSz cx="6858000" cy="9144000"/>
@@ -290,7 +288,7 @@
           <a:p>
             <a:fld id="{426F8926-F538-4858-AE80-D6CD98A67C38}" type="datetimeFigureOut">
               <a:rPr kumimoji="1" lang="ja-JP" altLang="en-US" smtClean="0"/>
-              <a:t>2015/12/4</a:t>
+              <a:t>15/12/11</a:t>
             </a:fld>
             <a:endParaRPr kumimoji="1" lang="ja-JP" altLang="en-US"/>
           </a:p>
@@ -492,7 +490,7 @@
           <a:p>
             <a:fld id="{426F8926-F538-4858-AE80-D6CD98A67C38}" type="datetimeFigureOut">
               <a:rPr kumimoji="1" lang="ja-JP" altLang="en-US" smtClean="0"/>
-              <a:t>2015/12/4</a:t>
+              <a:t>15/12/11</a:t>
             </a:fld>
             <a:endParaRPr kumimoji="1" lang="ja-JP" altLang="en-US"/>
           </a:p>
@@ -704,7 +702,7 @@
           <a:p>
             <a:fld id="{426F8926-F538-4858-AE80-D6CD98A67C38}" type="datetimeFigureOut">
               <a:rPr kumimoji="1" lang="ja-JP" altLang="en-US" smtClean="0"/>
-              <a:t>2015/12/4</a:t>
+              <a:t>15/12/11</a:t>
             </a:fld>
             <a:endParaRPr kumimoji="1" lang="ja-JP" altLang="en-US"/>
           </a:p>
@@ -906,7 +904,7 @@
           <a:p>
             <a:fld id="{426F8926-F538-4858-AE80-D6CD98A67C38}" type="datetimeFigureOut">
               <a:rPr kumimoji="1" lang="ja-JP" altLang="en-US" smtClean="0"/>
-              <a:t>2015/12/4</a:t>
+              <a:t>15/12/11</a:t>
             </a:fld>
             <a:endParaRPr kumimoji="1" lang="ja-JP" altLang="en-US"/>
           </a:p>
@@ -1152,7 +1150,7 @@
           <a:p>
             <a:fld id="{426F8926-F538-4858-AE80-D6CD98A67C38}" type="datetimeFigureOut">
               <a:rPr kumimoji="1" lang="ja-JP" altLang="en-US" smtClean="0"/>
-              <a:t>2015/12/4</a:t>
+              <a:t>15/12/11</a:t>
             </a:fld>
             <a:endParaRPr kumimoji="1" lang="ja-JP" altLang="en-US"/>
           </a:p>
@@ -1504,7 +1502,7 @@
           <a:p>
             <a:fld id="{426F8926-F538-4858-AE80-D6CD98A67C38}" type="datetimeFigureOut">
               <a:rPr kumimoji="1" lang="ja-JP" altLang="en-US" smtClean="0"/>
-              <a:t>2015/12/4</a:t>
+              <a:t>15/12/11</a:t>
             </a:fld>
             <a:endParaRPr kumimoji="1" lang="ja-JP" altLang="en-US"/>
           </a:p>
@@ -1990,7 +1988,7 @@
           <a:p>
             <a:fld id="{426F8926-F538-4858-AE80-D6CD98A67C38}" type="datetimeFigureOut">
               <a:rPr kumimoji="1" lang="ja-JP" altLang="en-US" smtClean="0"/>
-              <a:t>2015/12/4</a:t>
+              <a:t>15/12/11</a:t>
             </a:fld>
             <a:endParaRPr kumimoji="1" lang="ja-JP" altLang="en-US"/>
           </a:p>
@@ -2108,7 +2106,7 @@
           <a:p>
             <a:fld id="{426F8926-F538-4858-AE80-D6CD98A67C38}" type="datetimeFigureOut">
               <a:rPr kumimoji="1" lang="ja-JP" altLang="en-US" smtClean="0"/>
-              <a:t>2015/12/4</a:t>
+              <a:t>15/12/11</a:t>
             </a:fld>
             <a:endParaRPr kumimoji="1" lang="ja-JP" altLang="en-US"/>
           </a:p>
@@ -2203,7 +2201,7 @@
           <a:p>
             <a:fld id="{426F8926-F538-4858-AE80-D6CD98A67C38}" type="datetimeFigureOut">
               <a:rPr kumimoji="1" lang="ja-JP" altLang="en-US" smtClean="0"/>
-              <a:t>2015/12/4</a:t>
+              <a:t>15/12/11</a:t>
             </a:fld>
             <a:endParaRPr kumimoji="1" lang="ja-JP" altLang="en-US"/>
           </a:p>
@@ -2512,7 +2510,7 @@
           <a:p>
             <a:fld id="{426F8926-F538-4858-AE80-D6CD98A67C38}" type="datetimeFigureOut">
               <a:rPr kumimoji="1" lang="ja-JP" altLang="en-US" smtClean="0"/>
-              <a:t>2015/12/4</a:t>
+              <a:t>15/12/11</a:t>
             </a:fld>
             <a:endParaRPr kumimoji="1" lang="ja-JP" altLang="en-US"/>
           </a:p>
@@ -2765,7 +2763,7 @@
           <a:p>
             <a:fld id="{426F8926-F538-4858-AE80-D6CD98A67C38}" type="datetimeFigureOut">
               <a:rPr kumimoji="1" lang="ja-JP" altLang="en-US" smtClean="0"/>
-              <a:t>2015/12/4</a:t>
+              <a:t>15/12/11</a:t>
             </a:fld>
             <a:endParaRPr kumimoji="1" lang="ja-JP" altLang="en-US"/>
           </a:p>
@@ -3010,7 +3008,7 @@
           <a:p>
             <a:fld id="{426F8926-F538-4858-AE80-D6CD98A67C38}" type="datetimeFigureOut">
               <a:rPr kumimoji="1" lang="ja-JP" altLang="en-US" smtClean="0"/>
-              <a:t>2015/12/4</a:t>
+              <a:t>15/12/11</a:t>
             </a:fld>
             <a:endParaRPr kumimoji="1" lang="ja-JP" altLang="en-US"/>
           </a:p>
@@ -3393,7 +3391,7 @@
         </p:nvSpPr>
         <p:spPr>
           <a:xfrm>
-            <a:off x="5739339" y="1425004"/>
+            <a:off x="6232520" y="2852936"/>
             <a:ext cx="1145096" cy="307777"/>
           </a:xfrm>
           <a:prstGeom prst="rect">
@@ -3409,7 +3407,15 @@
           <a:p>
             <a:r>
               <a:rPr lang="en-US" altLang="ja-JP" sz="1400" dirty="0" smtClean="0"/>
-              <a:t>Private key</a:t>
+              <a:t>Private </a:t>
+            </a:r>
+            <a:r>
+              <a:rPr lang="en-US" altLang="ja-JP" sz="1400" dirty="0" smtClean="0"/>
+              <a:t>K</a:t>
+            </a:r>
+            <a:r>
+              <a:rPr lang="en-US" altLang="ja-JP" sz="1400" dirty="0" smtClean="0"/>
+              <a:t>ey</a:t>
             </a:r>
             <a:endParaRPr kumimoji="1" lang="ja-JP" altLang="en-US" sz="1400" dirty="0"/>
           </a:p>
@@ -3423,7 +3429,7 @@
         </p:nvSpPr>
         <p:spPr>
           <a:xfrm>
-            <a:off x="544125" y="3033092"/>
+            <a:off x="467544" y="4473252"/>
             <a:ext cx="936104" cy="547446"/>
           </a:xfrm>
           <a:prstGeom prst="flowChartDocument">
@@ -3458,7 +3464,31 @@
                   <a:schemeClr val="tx1"/>
                 </a:solidFill>
               </a:rPr>
-              <a:t>Plaintext</a:t>
+              <a:t>Plain</a:t>
+            </a:r>
+            <a:r>
+              <a:rPr kumimoji="1" lang="ja-JP" altLang="en-US" sz="1400" dirty="0" smtClean="0">
+                <a:solidFill>
+                  <a:schemeClr val="tx1"/>
+                </a:solidFill>
+              </a:rPr>
+              <a:t> </a:t>
+            </a:r>
+            <a:r>
+              <a:rPr kumimoji="1" lang="en-US" altLang="ja-JP" sz="1400" dirty="0" smtClean="0">
+                <a:solidFill>
+                  <a:schemeClr val="tx1"/>
+                </a:solidFill>
+              </a:rPr>
+              <a:t>T</a:t>
+            </a:r>
+            <a:r>
+              <a:rPr kumimoji="1" lang="en-US" altLang="ja-JP" sz="1400" dirty="0" smtClean="0">
+                <a:solidFill>
+                  <a:schemeClr val="tx1"/>
+                </a:solidFill>
+              </a:rPr>
+              <a:t>ext</a:t>
             </a:r>
             <a:endParaRPr kumimoji="1" lang="ja-JP" altLang="en-US" sz="1400" dirty="0">
               <a:solidFill>
@@ -3476,7 +3506,7 @@
         </p:nvSpPr>
         <p:spPr>
           <a:xfrm>
-            <a:off x="2627783" y="3025570"/>
+            <a:off x="2551202" y="4465730"/>
             <a:ext cx="1027589" cy="547446"/>
           </a:xfrm>
           <a:prstGeom prst="flowChartDocument">
@@ -3505,12 +3535,16 @@
           <a:p>
             <a:pPr algn="ctr"/>
             <a:r>
-              <a:rPr lang="en-US" altLang="ja-JP" sz="1400" dirty="0"/>
-              <a:t>C</a:t>
-            </a:r>
-            <a:r>
               <a:rPr lang="en-US" altLang="ja-JP" sz="1400" dirty="0" smtClean="0"/>
-              <a:t>iphertext</a:t>
+              <a:t>Cipher</a:t>
+            </a:r>
+            <a:r>
+              <a:rPr lang="en-US" altLang="ja-JP" sz="1400" dirty="0" smtClean="0"/>
+              <a:t> T</a:t>
+            </a:r>
+            <a:r>
+              <a:rPr lang="en-US" altLang="ja-JP" sz="1400" dirty="0" smtClean="0"/>
+              <a:t>ext</a:t>
             </a:r>
             <a:endParaRPr kumimoji="1" lang="ja-JP" altLang="en-US" sz="1400" dirty="0"/>
           </a:p>
@@ -3524,7 +3558,7 @@
         </p:nvSpPr>
         <p:spPr>
           <a:xfrm>
-            <a:off x="4124193" y="820995"/>
+            <a:off x="4196201" y="2261155"/>
             <a:ext cx="720080" cy="3544109"/>
           </a:xfrm>
           <a:prstGeom prst="ellipse">
@@ -3572,7 +3606,7 @@
         </p:nvCxnSpPr>
         <p:spPr>
           <a:xfrm>
-            <a:off x="4229646" y="1340018"/>
+            <a:off x="4301654" y="2780178"/>
             <a:ext cx="509174" cy="2506063"/>
           </a:xfrm>
           <a:prstGeom prst="line">
@@ -3605,7 +3639,7 @@
         </p:nvCxnSpPr>
         <p:spPr>
           <a:xfrm flipH="1">
-            <a:off x="4229646" y="1340018"/>
+            <a:off x="4301654" y="2780178"/>
             <a:ext cx="509174" cy="2506063"/>
           </a:xfrm>
           <a:prstGeom prst="line">
@@ -3635,7 +3669,7 @@
         </p:nvSpPr>
         <p:spPr>
           <a:xfrm>
-            <a:off x="1394611" y="2348880"/>
+            <a:off x="1318030" y="3789040"/>
             <a:ext cx="1305181" cy="307777"/>
           </a:xfrm>
           <a:prstGeom prst="rect">
@@ -3651,7 +3685,15 @@
           <a:p>
             <a:r>
               <a:rPr lang="en-US" altLang="ja-JP" sz="1400" dirty="0" smtClean="0"/>
-              <a:t>Common key</a:t>
+              <a:t>Common </a:t>
+            </a:r>
+            <a:r>
+              <a:rPr lang="en-US" altLang="ja-JP" sz="1400" dirty="0" smtClean="0"/>
+              <a:t>K</a:t>
+            </a:r>
+            <a:r>
+              <a:rPr lang="en-US" altLang="ja-JP" sz="1400" dirty="0" smtClean="0"/>
+              <a:t>ey</a:t>
             </a:r>
             <a:endParaRPr kumimoji="1" lang="ja-JP" altLang="en-US" sz="1400" dirty="0"/>
           </a:p>
@@ -3665,7 +3707,7 @@
         </p:nvSpPr>
         <p:spPr>
           <a:xfrm>
-            <a:off x="1691680" y="3185657"/>
+            <a:off x="1615099" y="4625817"/>
             <a:ext cx="792088" cy="242316"/>
           </a:xfrm>
           <a:prstGeom prst="rightArrow">
@@ -3705,7 +3747,7 @@
         </p:nvSpPr>
         <p:spPr>
           <a:xfrm>
-            <a:off x="2483768" y="2119846"/>
+            <a:off x="2407187" y="3560006"/>
             <a:ext cx="380833" cy="229034"/>
           </a:xfrm>
           <a:prstGeom prst="rightArrow">
@@ -3745,8 +3787,8 @@
         </p:nvSpPr>
         <p:spPr>
           <a:xfrm>
-            <a:off x="2267744" y="1465039"/>
-            <a:ext cx="1338307" cy="307777"/>
+            <a:off x="2119155" y="2905199"/>
+            <a:ext cx="936104" cy="307777"/>
           </a:xfrm>
           <a:prstGeom prst="rect">
             <a:avLst/>
@@ -3761,7 +3803,15 @@
           <a:p>
             <a:r>
               <a:rPr lang="en-US" altLang="ja-JP" sz="1400" dirty="0" smtClean="0"/>
-              <a:t>Public key</a:t>
+              <a:t>Public </a:t>
+            </a:r>
+            <a:r>
+              <a:rPr lang="en-US" altLang="ja-JP" sz="1400" dirty="0" smtClean="0"/>
+              <a:t>K</a:t>
+            </a:r>
+            <a:r>
+              <a:rPr lang="en-US" altLang="ja-JP" sz="1400" dirty="0" smtClean="0"/>
+              <a:t>ey</a:t>
             </a:r>
             <a:endParaRPr kumimoji="1" lang="ja-JP" altLang="en-US" sz="1400" dirty="0"/>
           </a:p>
@@ -3775,7 +3825,7 @@
         </p:nvSpPr>
         <p:spPr>
           <a:xfrm>
-            <a:off x="1943708" y="2708920"/>
+            <a:off x="1795119" y="4149080"/>
             <a:ext cx="180020" cy="432048"/>
           </a:xfrm>
           <a:prstGeom prst="downArrow">
@@ -3815,7 +3865,7 @@
         </p:nvSpPr>
         <p:spPr>
           <a:xfrm>
-            <a:off x="2609782" y="1763581"/>
+            <a:off x="2533201" y="3203741"/>
             <a:ext cx="90010" cy="289294"/>
           </a:xfrm>
           <a:prstGeom prst="downArrow">
@@ -3855,7 +3905,7 @@
         </p:nvSpPr>
         <p:spPr>
           <a:xfrm>
-            <a:off x="4096092" y="1671190"/>
+            <a:off x="4139952" y="1916832"/>
             <a:ext cx="951863" cy="307777"/>
           </a:xfrm>
           <a:prstGeom prst="rect">
@@ -3871,7 +3921,11 @@
           <a:p>
             <a:r>
               <a:rPr kumimoji="1" lang="en-US" altLang="ja-JP" sz="1400" dirty="0" smtClean="0"/>
-              <a:t>network</a:t>
+              <a:t>N</a:t>
+            </a:r>
+            <a:r>
+              <a:rPr kumimoji="1" lang="en-US" altLang="ja-JP" sz="1400" dirty="0" smtClean="0"/>
+              <a:t>etwork</a:t>
             </a:r>
             <a:endParaRPr kumimoji="1" lang="ja-JP" altLang="en-US" sz="1400" dirty="0"/>
           </a:p>
@@ -3885,7 +3939,7 @@
         </p:nvSpPr>
         <p:spPr>
           <a:xfrm>
-            <a:off x="6387411" y="2329135"/>
+            <a:off x="6792515" y="3769295"/>
             <a:ext cx="1305181" cy="307777"/>
           </a:xfrm>
           <a:prstGeom prst="rect">
@@ -3901,7 +3955,15 @@
           <a:p>
             <a:r>
               <a:rPr lang="en-US" altLang="ja-JP" sz="1400" dirty="0" smtClean="0"/>
-              <a:t>Common key</a:t>
+              <a:t>Common </a:t>
+            </a:r>
+            <a:r>
+              <a:rPr lang="en-US" altLang="ja-JP" sz="1400" dirty="0" smtClean="0"/>
+              <a:t>K</a:t>
+            </a:r>
+            <a:r>
+              <a:rPr lang="en-US" altLang="ja-JP" sz="1400" dirty="0" smtClean="0"/>
+              <a:t>ey</a:t>
             </a:r>
             <a:endParaRPr kumimoji="1" lang="ja-JP" altLang="en-US" sz="1400" dirty="0"/>
           </a:p>
@@ -3915,8 +3977,8 @@
         </p:nvSpPr>
         <p:spPr>
           <a:xfrm>
-            <a:off x="6243395" y="1741689"/>
-            <a:ext cx="90010" cy="289294"/>
+            <a:off x="6495518" y="3211713"/>
+            <a:ext cx="90010" cy="289295"/>
           </a:xfrm>
           <a:prstGeom prst="downArrow">
             <a:avLst/>
@@ -3955,7 +4017,7 @@
         </p:nvSpPr>
         <p:spPr>
           <a:xfrm>
-            <a:off x="5364088" y="2996952"/>
+            <a:off x="5580112" y="4453086"/>
             <a:ext cx="1008112" cy="547446"/>
           </a:xfrm>
           <a:prstGeom prst="flowChartDocument">
@@ -3985,7 +4047,15 @@
             <a:pPr algn="ctr"/>
             <a:r>
               <a:rPr lang="en-US" altLang="ja-JP" sz="1400" dirty="0" smtClean="0"/>
-              <a:t>Ciphertext</a:t>
+              <a:t>Cipher</a:t>
+            </a:r>
+            <a:r>
+              <a:rPr lang="en-US" altLang="ja-JP" sz="1400" dirty="0" smtClean="0"/>
+              <a:t> T</a:t>
+            </a:r>
+            <a:r>
+              <a:rPr lang="en-US" altLang="ja-JP" sz="1400" dirty="0" smtClean="0"/>
+              <a:t>ext</a:t>
             </a:r>
             <a:endParaRPr kumimoji="1" lang="ja-JP" altLang="en-US" sz="1400" dirty="0"/>
           </a:p>
@@ -3999,7 +4069,7 @@
         </p:nvSpPr>
         <p:spPr>
           <a:xfrm>
-            <a:off x="7380312" y="2996952"/>
+            <a:off x="7668344" y="4437112"/>
             <a:ext cx="936104" cy="547446"/>
           </a:xfrm>
           <a:prstGeom prst="flowChartDocument">
@@ -4034,7 +4104,23 @@
                   <a:schemeClr val="tx1"/>
                 </a:solidFill>
               </a:rPr>
-              <a:t>Plaintext</a:t>
+              <a:t>Plain</a:t>
+            </a:r>
+            <a:r>
+              <a:rPr kumimoji="1" lang="en-US" altLang="ja-JP" sz="1400" dirty="0" smtClean="0">
+                <a:solidFill>
+                  <a:schemeClr val="tx1"/>
+                </a:solidFill>
+              </a:rPr>
+              <a:t> T</a:t>
+            </a:r>
+            <a:r>
+              <a:rPr kumimoji="1" lang="en-US" altLang="ja-JP" sz="1400" dirty="0" smtClean="0">
+                <a:solidFill>
+                  <a:schemeClr val="tx1"/>
+                </a:solidFill>
+              </a:rPr>
+              <a:t>ext</a:t>
             </a:r>
             <a:endParaRPr kumimoji="1" lang="ja-JP" altLang="en-US" sz="1400" dirty="0">
               <a:solidFill>
@@ -4052,7 +4138,7 @@
         </p:nvSpPr>
         <p:spPr>
           <a:xfrm>
-            <a:off x="6056838" y="2106606"/>
+            <a:off x="6369504" y="3546766"/>
             <a:ext cx="380833" cy="229034"/>
           </a:xfrm>
           <a:prstGeom prst="rightArrow">
@@ -4092,7 +4178,7 @@
         </p:nvSpPr>
         <p:spPr>
           <a:xfrm>
-            <a:off x="6473711" y="3094879"/>
+            <a:off x="6738882" y="4589488"/>
             <a:ext cx="792088" cy="242316"/>
           </a:xfrm>
           <a:prstGeom prst="rightArrow">
@@ -4132,7 +4218,7 @@
         </p:nvSpPr>
         <p:spPr>
           <a:xfrm>
-            <a:off x="6908966" y="2605933"/>
+            <a:off x="7125588" y="4111466"/>
             <a:ext cx="180020" cy="432048"/>
           </a:xfrm>
           <a:prstGeom prst="downArrow">
@@ -4172,8 +4258,8 @@
         </p:nvSpPr>
         <p:spPr>
           <a:xfrm>
-            <a:off x="3949535" y="2149590"/>
-            <a:ext cx="1070272" cy="229034"/>
+            <a:off x="3967922" y="3589750"/>
+            <a:ext cx="1152128" cy="229034"/>
           </a:xfrm>
           <a:prstGeom prst="rightArrow">
             <a:avLst/>
@@ -4212,7 +4298,7 @@
         </p:nvSpPr>
         <p:spPr>
           <a:xfrm>
-            <a:off x="3949535" y="3140968"/>
+            <a:off x="3986598" y="4627823"/>
             <a:ext cx="1129476" cy="229034"/>
           </a:xfrm>
           <a:prstGeom prst="rightArrow">
@@ -4240,7 +4326,7 @@
           <a:lstStyle/>
           <a:p>
             <a:pPr algn="ctr"/>
-            <a:endParaRPr kumimoji="1" lang="ja-JP" altLang="en-US"/>
+            <a:endParaRPr kumimoji="1" lang="ja-JP" altLang="en-US" dirty="0"/>
           </a:p>
         </p:txBody>
       </p:sp>
@@ -4252,7 +4338,7 @@
         </p:nvSpPr>
         <p:spPr>
           <a:xfrm>
-            <a:off x="1108498" y="1979548"/>
+            <a:off x="1031917" y="3491716"/>
             <a:ext cx="871214" cy="369332"/>
           </a:xfrm>
           <a:prstGeom prst="rect">
@@ -4282,7 +4368,7 @@
         </p:nvSpPr>
         <p:spPr>
           <a:xfrm>
-            <a:off x="1688121" y="3429000"/>
+            <a:off x="1759115" y="4869160"/>
             <a:ext cx="871214" cy="369332"/>
           </a:xfrm>
           <a:prstGeom prst="rect">
@@ -4312,7 +4398,7 @@
         </p:nvSpPr>
         <p:spPr>
           <a:xfrm>
-            <a:off x="4067944" y="2574776"/>
+            <a:off x="4139952" y="3995772"/>
             <a:ext cx="871214" cy="369332"/>
           </a:xfrm>
           <a:prstGeom prst="rect">
@@ -4342,7 +4428,7 @@
         </p:nvSpPr>
         <p:spPr>
           <a:xfrm>
-            <a:off x="6365782" y="1721852"/>
+            <a:off x="6650418" y="3162012"/>
             <a:ext cx="871214" cy="369332"/>
           </a:xfrm>
           <a:prstGeom prst="rect">
@@ -4372,7 +4458,7 @@
         </p:nvSpPr>
         <p:spPr>
           <a:xfrm>
-            <a:off x="6804248" y="3347700"/>
+            <a:off x="6873560" y="4787860"/>
             <a:ext cx="871214" cy="369332"/>
           </a:xfrm>
           <a:prstGeom prst="rect">
@@ -4402,7 +4488,7 @@
         </p:nvSpPr>
         <p:spPr>
           <a:xfrm>
-            <a:off x="4932040" y="2401143"/>
+            <a:off x="5145368" y="3841303"/>
             <a:ext cx="1383363" cy="307777"/>
           </a:xfrm>
           <a:prstGeom prst="rect">
@@ -4418,7 +4504,15 @@
           <a:p>
             <a:r>
               <a:rPr lang="en-US" altLang="ja-JP" sz="1400" dirty="0" smtClean="0"/>
-              <a:t>Encrypted key</a:t>
+              <a:t>Encrypted </a:t>
+            </a:r>
+            <a:r>
+              <a:rPr lang="en-US" altLang="ja-JP" sz="1400" dirty="0" smtClean="0"/>
+              <a:t>K</a:t>
+            </a:r>
+            <a:r>
+              <a:rPr lang="en-US" altLang="ja-JP" sz="1400" dirty="0" smtClean="0"/>
+              <a:t>ey</a:t>
             </a:r>
             <a:endParaRPr kumimoji="1" lang="ja-JP" altLang="en-US" sz="1400" dirty="0"/>
           </a:p>
@@ -4432,7 +4526,7 @@
         </p:nvSpPr>
         <p:spPr>
           <a:xfrm>
-            <a:off x="3059832" y="1619508"/>
+            <a:off x="2116610" y="3140968"/>
             <a:ext cx="871214" cy="369332"/>
           </a:xfrm>
           <a:prstGeom prst="rect">
@@ -4462,7 +4556,7 @@
         </p:nvSpPr>
         <p:spPr>
           <a:xfrm>
-            <a:off x="2756589" y="2420888"/>
+            <a:off x="2680008" y="3861048"/>
             <a:ext cx="1383363" cy="307777"/>
           </a:xfrm>
           <a:prstGeom prst="rect">
@@ -4478,7 +4572,15 @@
           <a:p>
             <a:r>
               <a:rPr lang="en-US" altLang="ja-JP" sz="1400" dirty="0" smtClean="0"/>
-              <a:t>Encrypted key</a:t>
+              <a:t>Encrypted </a:t>
+            </a:r>
+            <a:r>
+              <a:rPr lang="en-US" altLang="ja-JP" sz="1400" dirty="0" smtClean="0"/>
+              <a:t>K</a:t>
+            </a:r>
+            <a:r>
+              <a:rPr lang="en-US" altLang="ja-JP" sz="1400" dirty="0" smtClean="0"/>
+              <a:t>ey</a:t>
             </a:r>
             <a:endParaRPr kumimoji="1" lang="ja-JP" altLang="en-US" sz="1400" dirty="0"/>
           </a:p>
@@ -4492,7 +4594,7 @@
         </p:nvGrpSpPr>
         <p:grpSpPr>
           <a:xfrm>
-            <a:off x="5789268" y="1155166"/>
+            <a:off x="6282449" y="2595326"/>
             <a:ext cx="823988" cy="243884"/>
             <a:chOff x="2544809" y="3846081"/>
             <a:chExt cx="823988" cy="243884"/>
@@ -4636,8 +4738,8 @@
         </p:nvGrpSpPr>
         <p:grpSpPr>
           <a:xfrm>
-            <a:off x="2284270" y="1196752"/>
-            <a:ext cx="809110" cy="228917"/>
+            <a:off x="2250721" y="2636912"/>
+            <a:ext cx="809111" cy="228917"/>
             <a:chOff x="2559687" y="4252086"/>
             <a:chExt cx="809110" cy="228917"/>
           </a:xfrm>
@@ -4789,7 +4891,7 @@
         </p:nvGrpSpPr>
         <p:grpSpPr>
           <a:xfrm>
-            <a:off x="1558088" y="2090347"/>
+            <a:off x="1481507" y="3530507"/>
             <a:ext cx="781664" cy="288032"/>
             <a:chOff x="2559687" y="4689140"/>
             <a:chExt cx="781664" cy="288032"/>
@@ -4942,7 +5044,7 @@
         </p:nvGrpSpPr>
         <p:grpSpPr>
           <a:xfrm>
-            <a:off x="6569349" y="2052875"/>
+            <a:off x="6883984" y="3493035"/>
             <a:ext cx="781664" cy="288032"/>
             <a:chOff x="2559687" y="4689140"/>
             <a:chExt cx="781664" cy="288032"/>
@@ -5095,7 +5197,7 @@
         </p:nvGrpSpPr>
         <p:grpSpPr>
           <a:xfrm>
-            <a:off x="2951333" y="1977944"/>
+            <a:off x="2874752" y="3418104"/>
             <a:ext cx="888935" cy="504056"/>
             <a:chOff x="5388817" y="3820038"/>
             <a:chExt cx="888935" cy="504056"/>
@@ -5311,7 +5413,7 @@
         </p:nvGrpSpPr>
         <p:grpSpPr>
           <a:xfrm>
-            <a:off x="5085311" y="1944862"/>
+            <a:off x="5298639" y="3385022"/>
             <a:ext cx="888935" cy="504056"/>
             <a:chOff x="5388817" y="3820038"/>
             <a:chExt cx="888935" cy="504056"/>
@@ -5519,87 +5621,16 @@
           </p:sp>
         </p:grpSp>
       </p:grpSp>
-    </p:spTree>
-    <p:extLst>
-      <p:ext uri="{BB962C8B-B14F-4D97-AF65-F5344CB8AC3E}">
-        <p14:creationId xmlns:p14="http://schemas.microsoft.com/office/powerpoint/2010/main" val="752783101"/>
-      </p:ext>
-    </p:extLst>
-  </p:cSld>
-  <p:clrMapOvr>
-    <a:masterClrMapping/>
-  </p:clrMapOvr>
-</p:sld>
-</file>
-
-<file path=ppt/slides/slide2.xml><?xml version="1.0" encoding="utf-8"?>
-<p:sld xmlns:a="http://schemas.openxmlformats.org/drawingml/2006/main" xmlns:r="http://schemas.openxmlformats.org/officeDocument/2006/relationships" xmlns:p="http://schemas.openxmlformats.org/presentationml/2006/main">
-  <p:cSld>
-    <p:spTree>
-      <p:nvGrpSpPr>
-        <p:cNvPr id="1" name=""/>
-        <p:cNvGrpSpPr/>
-        <p:nvPr/>
-      </p:nvGrpSpPr>
-      <p:grpSpPr>
-        <a:xfrm>
-          <a:off x="0" y="0"/>
-          <a:ext cx="0" cy="0"/>
-          <a:chOff x="0" y="0"/>
-          <a:chExt cx="0" cy="0"/>
-        </a:xfrm>
-      </p:grpSpPr>
-      <p:pic>
-        <p:nvPicPr>
-          <p:cNvPr id="4" name="Picture 5" descr="C:\Users\btsatoukzn\AppData\Local\Microsoft\Windows\Temporary Internet Files\Content.IE5\3TY4A3CC\220px-Llave_bronce[1].jpg"/>
-          <p:cNvPicPr>
-            <a:picLocks noChangeAspect="1" noChangeArrowheads="1"/>
-          </p:cNvPicPr>
-          <p:nvPr/>
-        </p:nvPicPr>
-        <p:blipFill>
-          <a:blip r:embed="rId2">
-            <a:extLst>
-              <a:ext uri="{28A0092B-C50C-407E-A947-70E740481C1C}">
-                <a14:useLocalDpi xmlns:a14="http://schemas.microsoft.com/office/drawing/2010/main" val="0"/>
-              </a:ext>
-            </a:extLst>
-          </a:blip>
-          <a:srcRect/>
-          <a:stretch>
-            <a:fillRect/>
-          </a:stretch>
-        </p:blipFill>
-        <p:spPr bwMode="auto">
-          <a:xfrm rot="5400000">
-            <a:off x="5765348" y="594679"/>
-            <a:ext cx="1024808" cy="1364858"/>
-          </a:xfrm>
-          <a:prstGeom prst="rect">
-            <a:avLst/>
-          </a:prstGeom>
-          <a:noFill/>
-          <a:extLst>
-            <a:ext uri="{909E8E84-426E-40DD-AFC4-6F175D3DCCD1}">
-              <a14:hiddenFill xmlns:a14="http://schemas.microsoft.com/office/drawing/2010/main">
-                <a:solidFill>
-                  <a:srgbClr val="FFFFFF"/>
-                </a:solidFill>
-              </a14:hiddenFill>
-            </a:ext>
-          </a:extLst>
-        </p:spPr>
-      </p:pic>
-      <p:sp>
-        <p:nvSpPr>
-          <p:cNvPr id="5" name="テキスト ボックス 4"/>
+      <p:sp>
+        <p:nvSpPr>
+          <p:cNvPr id="75" name="テキスト ボックス 74"/>
           <p:cNvSpPr txBox="1"/>
           <p:nvPr/>
         </p:nvSpPr>
         <p:spPr>
           <a:xfrm>
-            <a:off x="5739339" y="1425004"/>
-            <a:ext cx="1145096" cy="307777"/>
+            <a:off x="5252422" y="2852936"/>
+            <a:ext cx="936104" cy="307777"/>
           </a:xfrm>
           <a:prstGeom prst="rect">
             <a:avLst/>
@@ -5614,1183 +5645,142 @@
           <a:p>
             <a:r>
               <a:rPr lang="en-US" altLang="ja-JP" sz="1400" dirty="0" smtClean="0"/>
-              <a:t>Private key</a:t>
+              <a:t>Public </a:t>
+            </a:r>
+            <a:r>
+              <a:rPr lang="en-US" altLang="ja-JP" sz="1400" dirty="0" smtClean="0"/>
+              <a:t>K</a:t>
+            </a:r>
+            <a:r>
+              <a:rPr lang="en-US" altLang="ja-JP" sz="1400" dirty="0" smtClean="0"/>
+              <a:t>ey</a:t>
             </a:r>
             <a:endParaRPr kumimoji="1" lang="ja-JP" altLang="en-US" sz="1400" dirty="0"/>
-          </a:p>
-        </p:txBody>
-      </p:sp>
-      <p:sp>
-        <p:nvSpPr>
-          <p:cNvPr id="6" name="フローチャート : 書類 5"/>
-          <p:cNvSpPr/>
-          <p:nvPr/>
-        </p:nvSpPr>
-        <p:spPr>
-          <a:xfrm>
-            <a:off x="544125" y="3033092"/>
-            <a:ext cx="936104" cy="547446"/>
-          </a:xfrm>
-          <a:prstGeom prst="flowChartDocument">
-            <a:avLst/>
-          </a:prstGeom>
-          <a:noFill/>
-        </p:spPr>
-        <p:style>
-          <a:lnRef idx="2">
-            <a:schemeClr val="accent1">
-              <a:shade val="50000"/>
-            </a:schemeClr>
-          </a:lnRef>
-          <a:fillRef idx="1">
-            <a:schemeClr val="accent1"/>
-          </a:fillRef>
-          <a:effectRef idx="0">
-            <a:schemeClr val="accent1"/>
-          </a:effectRef>
-          <a:fontRef idx="minor">
-            <a:schemeClr val="lt1"/>
-          </a:fontRef>
-        </p:style>
-        <p:txBody>
-          <a:bodyPr rtlCol="0" anchor="ctr"/>
-          <a:lstStyle/>
-          <a:p>
-            <a:pPr algn="ctr"/>
-            <a:r>
-              <a:rPr kumimoji="1" lang="en-US" altLang="ja-JP" sz="1400" dirty="0" smtClean="0">
-                <a:solidFill>
-                  <a:schemeClr val="tx1"/>
-                </a:solidFill>
-              </a:rPr>
-              <a:t>plaintext</a:t>
-            </a:r>
-            <a:endParaRPr kumimoji="1" lang="ja-JP" altLang="en-US" sz="1400" dirty="0">
-              <a:solidFill>
-                <a:schemeClr val="tx1"/>
-              </a:solidFill>
-            </a:endParaRPr>
-          </a:p>
-        </p:txBody>
-      </p:sp>
-      <p:sp>
-        <p:nvSpPr>
-          <p:cNvPr id="7" name="フローチャート : 書類 6"/>
-          <p:cNvSpPr/>
-          <p:nvPr/>
-        </p:nvSpPr>
-        <p:spPr>
-          <a:xfrm>
-            <a:off x="2627784" y="3025570"/>
-            <a:ext cx="936104" cy="547446"/>
-          </a:xfrm>
-          <a:prstGeom prst="flowChartDocument">
-            <a:avLst/>
-          </a:prstGeom>
-        </p:spPr>
-        <p:style>
-          <a:lnRef idx="2">
-            <a:schemeClr val="accent1">
-              <a:shade val="50000"/>
-            </a:schemeClr>
-          </a:lnRef>
-          <a:fillRef idx="1">
-            <a:schemeClr val="accent1"/>
-          </a:fillRef>
-          <a:effectRef idx="0">
-            <a:schemeClr val="accent1"/>
-          </a:effectRef>
-          <a:fontRef idx="minor">
-            <a:schemeClr val="lt1"/>
-          </a:fontRef>
-        </p:style>
-        <p:txBody>
-          <a:bodyPr rtlCol="0" anchor="ctr"/>
-          <a:lstStyle/>
-          <a:p>
-            <a:pPr algn="ctr"/>
-            <a:r>
-              <a:rPr lang="en-US" altLang="ja-JP" sz="1400" dirty="0" err="1" smtClean="0"/>
-              <a:t>ciphertext</a:t>
-            </a:r>
-            <a:endParaRPr kumimoji="1" lang="ja-JP" altLang="en-US" sz="1400" dirty="0"/>
-          </a:p>
-        </p:txBody>
-      </p:sp>
-      <p:sp>
-        <p:nvSpPr>
-          <p:cNvPr id="2" name="円/楕円 1"/>
-          <p:cNvSpPr/>
-          <p:nvPr/>
-        </p:nvSpPr>
-        <p:spPr>
-          <a:xfrm>
-            <a:off x="4124193" y="820995"/>
-            <a:ext cx="720080" cy="3544109"/>
-          </a:xfrm>
-          <a:prstGeom prst="ellipse">
-            <a:avLst/>
-          </a:prstGeom>
-          <a:noFill/>
-        </p:spPr>
-        <p:style>
-          <a:lnRef idx="2">
-            <a:schemeClr val="accent1">
-              <a:shade val="50000"/>
-            </a:schemeClr>
-          </a:lnRef>
-          <a:fillRef idx="1">
-            <a:schemeClr val="accent1"/>
-          </a:fillRef>
-          <a:effectRef idx="0">
-            <a:schemeClr val="accent1"/>
-          </a:effectRef>
-          <a:fontRef idx="minor">
-            <a:schemeClr val="lt1"/>
-          </a:fontRef>
-        </p:style>
-        <p:txBody>
-          <a:bodyPr rtlCol="0" anchor="ctr"/>
-          <a:lstStyle/>
-          <a:p>
-            <a:pPr algn="ctr"/>
-            <a:endParaRPr kumimoji="1" lang="ja-JP" altLang="en-US" dirty="0">
-              <a:solidFill>
-                <a:schemeClr val="tx1"/>
-              </a:solidFill>
-            </a:endParaRPr>
-          </a:p>
-        </p:txBody>
-      </p:sp>
-      <p:cxnSp>
-        <p:nvCxnSpPr>
-          <p:cNvPr id="8" name="直線コネクタ 7"/>
-          <p:cNvCxnSpPr>
-            <a:stCxn id="2" idx="1"/>
-            <a:endCxn id="2" idx="5"/>
-          </p:cNvCxnSpPr>
-          <p:nvPr/>
-        </p:nvCxnSpPr>
-        <p:spPr>
-          <a:xfrm>
-            <a:off x="4229646" y="1340018"/>
-            <a:ext cx="509174" cy="2506063"/>
-          </a:xfrm>
-          <a:prstGeom prst="line">
-            <a:avLst/>
-          </a:prstGeom>
-        </p:spPr>
-        <p:style>
-          <a:lnRef idx="1">
-            <a:schemeClr val="accent1"/>
-          </a:lnRef>
-          <a:fillRef idx="0">
-            <a:schemeClr val="accent1"/>
-          </a:fillRef>
-          <a:effectRef idx="0">
-            <a:schemeClr val="accent1"/>
-          </a:effectRef>
-          <a:fontRef idx="minor">
-            <a:schemeClr val="tx1"/>
-          </a:fontRef>
-        </p:style>
-      </p:cxnSp>
-      <p:cxnSp>
-        <p:nvCxnSpPr>
-          <p:cNvPr id="10" name="直線コネクタ 9"/>
-          <p:cNvCxnSpPr>
-            <a:stCxn id="2" idx="7"/>
-            <a:endCxn id="2" idx="3"/>
-          </p:cNvCxnSpPr>
-          <p:nvPr/>
-        </p:nvCxnSpPr>
-        <p:spPr>
-          <a:xfrm flipH="1">
-            <a:off x="4229646" y="1340018"/>
-            <a:ext cx="509174" cy="2506063"/>
-          </a:xfrm>
-          <a:prstGeom prst="line">
-            <a:avLst/>
-          </a:prstGeom>
-        </p:spPr>
-        <p:style>
-          <a:lnRef idx="1">
-            <a:schemeClr val="accent1"/>
-          </a:lnRef>
-          <a:fillRef idx="0">
-            <a:schemeClr val="accent1"/>
-          </a:fillRef>
-          <a:effectRef idx="0">
-            <a:schemeClr val="accent1"/>
-          </a:effectRef>
-          <a:fontRef idx="minor">
-            <a:schemeClr val="tx1"/>
-          </a:fontRef>
-        </p:style>
-      </p:cxnSp>
-      <p:pic>
-        <p:nvPicPr>
-          <p:cNvPr id="21" name="Picture 6" descr="C:\Users\btsatoukzn\AppData\Local\Microsoft\Windows\Temporary Internet Files\Content.IE5\OBY1ZMWA\sgi01a201411140000[1].jpg"/>
-          <p:cNvPicPr>
-            <a:picLocks noChangeAspect="1" noChangeArrowheads="1"/>
-          </p:cNvPicPr>
-          <p:nvPr/>
-        </p:nvPicPr>
-        <p:blipFill>
-          <a:blip r:embed="rId3" cstate="print">
-            <a:extLst>
-              <a:ext uri="{28A0092B-C50C-407E-A947-70E740481C1C}">
-                <a14:useLocalDpi xmlns:a14="http://schemas.microsoft.com/office/drawing/2010/main" val="0"/>
-              </a:ext>
-            </a:extLst>
-          </a:blip>
-          <a:srcRect/>
-          <a:stretch>
-            <a:fillRect/>
-          </a:stretch>
-        </p:blipFill>
-        <p:spPr bwMode="auto">
-          <a:xfrm>
-            <a:off x="1547664" y="1844824"/>
-            <a:ext cx="792088" cy="792088"/>
-          </a:xfrm>
-          <a:prstGeom prst="rect">
-            <a:avLst/>
-          </a:prstGeom>
-          <a:noFill/>
-          <a:extLst>
-            <a:ext uri="{909E8E84-426E-40DD-AFC4-6F175D3DCCD1}">
-              <a14:hiddenFill xmlns:a14="http://schemas.microsoft.com/office/drawing/2010/main">
-                <a:solidFill>
-                  <a:srgbClr val="FFFFFF"/>
-                </a:solidFill>
-              </a14:hiddenFill>
-            </a:ext>
-          </a:extLst>
-        </p:spPr>
-      </p:pic>
-      <p:sp>
-        <p:nvSpPr>
-          <p:cNvPr id="22" name="テキスト ボックス 21"/>
-          <p:cNvSpPr txBox="1"/>
-          <p:nvPr/>
-        </p:nvSpPr>
-        <p:spPr>
-          <a:xfrm>
-            <a:off x="1394611" y="2348880"/>
-            <a:ext cx="1305181" cy="307777"/>
-          </a:xfrm>
-          <a:prstGeom prst="rect">
-            <a:avLst/>
-          </a:prstGeom>
-          <a:noFill/>
-        </p:spPr>
-        <p:txBody>
-          <a:bodyPr wrap="square" rtlCol="0">
-            <a:spAutoFit/>
-          </a:bodyPr>
-          <a:lstStyle/>
-          <a:p>
-            <a:r>
-              <a:rPr lang="en-US" altLang="ja-JP" sz="1400" dirty="0" smtClean="0"/>
-              <a:t>Common key</a:t>
-            </a:r>
-            <a:endParaRPr kumimoji="1" lang="ja-JP" altLang="en-US" sz="1400" dirty="0"/>
-          </a:p>
-        </p:txBody>
-      </p:sp>
-      <p:sp>
-        <p:nvSpPr>
-          <p:cNvPr id="23" name="右矢印 22"/>
-          <p:cNvSpPr/>
-          <p:nvPr/>
-        </p:nvSpPr>
-        <p:spPr>
-          <a:xfrm>
-            <a:off x="1691680" y="3185657"/>
-            <a:ext cx="792088" cy="242316"/>
-          </a:xfrm>
-          <a:prstGeom prst="rightArrow">
-            <a:avLst/>
-          </a:prstGeom>
-        </p:spPr>
-        <p:style>
-          <a:lnRef idx="2">
-            <a:schemeClr val="accent2">
-              <a:shade val="50000"/>
-            </a:schemeClr>
-          </a:lnRef>
-          <a:fillRef idx="1">
-            <a:schemeClr val="accent2"/>
-          </a:fillRef>
-          <a:effectRef idx="0">
-            <a:schemeClr val="accent2"/>
-          </a:effectRef>
-          <a:fontRef idx="minor">
-            <a:schemeClr val="lt1"/>
-          </a:fontRef>
-        </p:style>
-        <p:txBody>
-          <a:bodyPr rtlCol="0" anchor="ctr"/>
-          <a:lstStyle/>
-          <a:p>
-            <a:pPr algn="ctr"/>
-            <a:endParaRPr kumimoji="1" lang="ja-JP" altLang="en-US"/>
-          </a:p>
-        </p:txBody>
-      </p:sp>
-      <p:sp>
-        <p:nvSpPr>
-          <p:cNvPr id="26" name="右矢印 25"/>
-          <p:cNvSpPr/>
-          <p:nvPr/>
-        </p:nvSpPr>
-        <p:spPr>
-          <a:xfrm>
-            <a:off x="2483768" y="2119846"/>
-            <a:ext cx="380833" cy="229034"/>
-          </a:xfrm>
-          <a:prstGeom prst="rightArrow">
-            <a:avLst/>
-          </a:prstGeom>
-        </p:spPr>
-        <p:style>
-          <a:lnRef idx="2">
-            <a:schemeClr val="accent2">
-              <a:shade val="50000"/>
-            </a:schemeClr>
-          </a:lnRef>
-          <a:fillRef idx="1">
-            <a:schemeClr val="accent2"/>
-          </a:fillRef>
-          <a:effectRef idx="0">
-            <a:schemeClr val="accent2"/>
-          </a:effectRef>
-          <a:fontRef idx="minor">
-            <a:schemeClr val="lt1"/>
-          </a:fontRef>
-        </p:style>
-        <p:txBody>
-          <a:bodyPr rtlCol="0" anchor="ctr"/>
-          <a:lstStyle/>
-          <a:p>
-            <a:pPr algn="ctr"/>
-            <a:endParaRPr kumimoji="1" lang="ja-JP" altLang="en-US"/>
-          </a:p>
-        </p:txBody>
-      </p:sp>
-      <p:pic>
-        <p:nvPicPr>
-          <p:cNvPr id="27" name="Picture 4" descr="C:\Users\btsatoukzn\AppData\Local\Microsoft\Windows\Temporary Internet Files\Content.IE5\M6M6BGPK\lgi01b201408170400[1].jpg"/>
-          <p:cNvPicPr>
-            <a:picLocks noChangeAspect="1" noChangeArrowheads="1"/>
-          </p:cNvPicPr>
-          <p:nvPr/>
-        </p:nvPicPr>
-        <p:blipFill>
-          <a:blip r:embed="rId4" cstate="print">
-            <a:extLst>
-              <a:ext uri="{28A0092B-C50C-407E-A947-70E740481C1C}">
-                <a14:useLocalDpi xmlns:a14="http://schemas.microsoft.com/office/drawing/2010/main" val="0"/>
-              </a:ext>
-            </a:extLst>
-          </a:blip>
-          <a:srcRect/>
-          <a:stretch>
-            <a:fillRect/>
-          </a:stretch>
-        </p:blipFill>
-        <p:spPr bwMode="auto">
-          <a:xfrm rot="5400000">
-            <a:off x="2513613" y="732402"/>
-            <a:ext cx="372358" cy="1089412"/>
-          </a:xfrm>
-          <a:prstGeom prst="rect">
-            <a:avLst/>
-          </a:prstGeom>
-          <a:noFill/>
-          <a:extLst>
-            <a:ext uri="{909E8E84-426E-40DD-AFC4-6F175D3DCCD1}">
-              <a14:hiddenFill xmlns:a14="http://schemas.microsoft.com/office/drawing/2010/main">
-                <a:solidFill>
-                  <a:srgbClr val="FFFFFF"/>
-                </a:solidFill>
-              </a14:hiddenFill>
-            </a:ext>
-          </a:extLst>
-        </p:spPr>
-      </p:pic>
-      <p:sp>
-        <p:nvSpPr>
-          <p:cNvPr id="28" name="テキスト ボックス 27"/>
-          <p:cNvSpPr txBox="1"/>
-          <p:nvPr/>
-        </p:nvSpPr>
-        <p:spPr>
-          <a:xfrm>
-            <a:off x="2267744" y="1465039"/>
-            <a:ext cx="1338307" cy="307777"/>
-          </a:xfrm>
-          <a:prstGeom prst="rect">
-            <a:avLst/>
-          </a:prstGeom>
-          <a:noFill/>
-        </p:spPr>
-        <p:txBody>
-          <a:bodyPr wrap="square" rtlCol="0">
-            <a:spAutoFit/>
-          </a:bodyPr>
-          <a:lstStyle/>
-          <a:p>
-            <a:r>
-              <a:rPr lang="en-US" altLang="ja-JP" sz="1400" dirty="0" smtClean="0"/>
-              <a:t>Public key</a:t>
-            </a:r>
-            <a:endParaRPr kumimoji="1" lang="ja-JP" altLang="en-US" sz="1400" dirty="0"/>
-          </a:p>
-        </p:txBody>
-      </p:sp>
-      <p:sp>
-        <p:nvSpPr>
-          <p:cNvPr id="29" name="下矢印 28"/>
-          <p:cNvSpPr/>
-          <p:nvPr/>
-        </p:nvSpPr>
-        <p:spPr>
-          <a:xfrm>
-            <a:off x="1943708" y="2708920"/>
-            <a:ext cx="180020" cy="432048"/>
-          </a:xfrm>
-          <a:prstGeom prst="downArrow">
-            <a:avLst/>
-          </a:prstGeom>
-        </p:spPr>
-        <p:style>
-          <a:lnRef idx="2">
-            <a:schemeClr val="accent2">
-              <a:shade val="50000"/>
-            </a:schemeClr>
-          </a:lnRef>
-          <a:fillRef idx="1">
-            <a:schemeClr val="accent2"/>
-          </a:fillRef>
-          <a:effectRef idx="0">
-            <a:schemeClr val="accent2"/>
-          </a:effectRef>
-          <a:fontRef idx="minor">
-            <a:schemeClr val="lt1"/>
-          </a:fontRef>
-        </p:style>
-        <p:txBody>
-          <a:bodyPr rtlCol="0" anchor="ctr"/>
-          <a:lstStyle/>
-          <a:p>
-            <a:pPr algn="ctr"/>
-            <a:endParaRPr kumimoji="1" lang="ja-JP" altLang="en-US"/>
-          </a:p>
-        </p:txBody>
-      </p:sp>
-      <p:sp>
-        <p:nvSpPr>
-          <p:cNvPr id="30" name="下矢印 29"/>
-          <p:cNvSpPr/>
-          <p:nvPr/>
-        </p:nvSpPr>
-        <p:spPr>
-          <a:xfrm>
-            <a:off x="2609782" y="1763581"/>
-            <a:ext cx="90010" cy="289294"/>
-          </a:xfrm>
-          <a:prstGeom prst="downArrow">
-            <a:avLst/>
-          </a:prstGeom>
-        </p:spPr>
-        <p:style>
-          <a:lnRef idx="2">
-            <a:schemeClr val="accent2">
-              <a:shade val="50000"/>
-            </a:schemeClr>
-          </a:lnRef>
-          <a:fillRef idx="1">
-            <a:schemeClr val="accent2"/>
-          </a:fillRef>
-          <a:effectRef idx="0">
-            <a:schemeClr val="accent2"/>
-          </a:effectRef>
-          <a:fontRef idx="minor">
-            <a:schemeClr val="lt1"/>
-          </a:fontRef>
-        </p:style>
-        <p:txBody>
-          <a:bodyPr rtlCol="0" anchor="ctr"/>
-          <a:lstStyle/>
-          <a:p>
-            <a:pPr algn="ctr"/>
-            <a:endParaRPr kumimoji="1" lang="ja-JP" altLang="en-US"/>
-          </a:p>
-        </p:txBody>
-      </p:sp>
-      <p:sp>
-        <p:nvSpPr>
-          <p:cNvPr id="31" name="テキスト ボックス 30"/>
-          <p:cNvSpPr txBox="1"/>
-          <p:nvPr/>
-        </p:nvSpPr>
-        <p:spPr>
-          <a:xfrm>
-            <a:off x="4096092" y="1671190"/>
-            <a:ext cx="951863" cy="307777"/>
-          </a:xfrm>
-          <a:prstGeom prst="rect">
-            <a:avLst/>
-          </a:prstGeom>
-          <a:noFill/>
-        </p:spPr>
-        <p:txBody>
-          <a:bodyPr wrap="square" rtlCol="0">
-            <a:spAutoFit/>
-          </a:bodyPr>
-          <a:lstStyle/>
-          <a:p>
-            <a:r>
-              <a:rPr kumimoji="1" lang="en-US" altLang="ja-JP" sz="1400" dirty="0" smtClean="0"/>
-              <a:t>network</a:t>
-            </a:r>
-            <a:endParaRPr kumimoji="1" lang="ja-JP" altLang="en-US" sz="1400" dirty="0"/>
-          </a:p>
-        </p:txBody>
-      </p:sp>
-      <p:pic>
-        <p:nvPicPr>
-          <p:cNvPr id="34" name="Picture 6" descr="C:\Users\btsatoukzn\AppData\Local\Microsoft\Windows\Temporary Internet Files\Content.IE5\OBY1ZMWA\sgi01a201411140000[1].jpg"/>
-          <p:cNvPicPr>
-            <a:picLocks noChangeAspect="1" noChangeArrowheads="1"/>
-          </p:cNvPicPr>
-          <p:nvPr/>
-        </p:nvPicPr>
-        <p:blipFill>
-          <a:blip r:embed="rId3" cstate="print">
-            <a:extLst>
-              <a:ext uri="{28A0092B-C50C-407E-A947-70E740481C1C}">
-                <a14:useLocalDpi xmlns:a14="http://schemas.microsoft.com/office/drawing/2010/main" val="0"/>
-              </a:ext>
-            </a:extLst>
-          </a:blip>
-          <a:srcRect/>
-          <a:stretch>
-            <a:fillRect/>
-          </a:stretch>
-        </p:blipFill>
-        <p:spPr bwMode="auto">
-          <a:xfrm>
-            <a:off x="6540464" y="1825079"/>
-            <a:ext cx="792088" cy="792088"/>
-          </a:xfrm>
-          <a:prstGeom prst="rect">
-            <a:avLst/>
-          </a:prstGeom>
-          <a:noFill/>
-          <a:extLst>
-            <a:ext uri="{909E8E84-426E-40DD-AFC4-6F175D3DCCD1}">
-              <a14:hiddenFill xmlns:a14="http://schemas.microsoft.com/office/drawing/2010/main">
-                <a:solidFill>
-                  <a:srgbClr val="FFFFFF"/>
-                </a:solidFill>
-              </a14:hiddenFill>
-            </a:ext>
-          </a:extLst>
-        </p:spPr>
-      </p:pic>
-      <p:sp>
-        <p:nvSpPr>
-          <p:cNvPr id="35" name="テキスト ボックス 34"/>
-          <p:cNvSpPr txBox="1"/>
-          <p:nvPr/>
-        </p:nvSpPr>
-        <p:spPr>
-          <a:xfrm>
-            <a:off x="6387411" y="2329135"/>
-            <a:ext cx="1305181" cy="307777"/>
-          </a:xfrm>
-          <a:prstGeom prst="rect">
-            <a:avLst/>
-          </a:prstGeom>
-          <a:noFill/>
-        </p:spPr>
-        <p:txBody>
-          <a:bodyPr wrap="square" rtlCol="0">
-            <a:spAutoFit/>
-          </a:bodyPr>
-          <a:lstStyle/>
-          <a:p>
-            <a:r>
-              <a:rPr lang="en-US" altLang="ja-JP" sz="1400" dirty="0" smtClean="0"/>
-              <a:t>Common key</a:t>
-            </a:r>
-            <a:endParaRPr kumimoji="1" lang="ja-JP" altLang="en-US" sz="1400" dirty="0"/>
-          </a:p>
-        </p:txBody>
-      </p:sp>
-      <p:sp>
-        <p:nvSpPr>
-          <p:cNvPr id="37" name="下矢印 36"/>
-          <p:cNvSpPr/>
-          <p:nvPr/>
-        </p:nvSpPr>
-        <p:spPr>
-          <a:xfrm>
-            <a:off x="6243395" y="1741689"/>
-            <a:ext cx="90010" cy="289294"/>
-          </a:xfrm>
-          <a:prstGeom prst="downArrow">
-            <a:avLst/>
-          </a:prstGeom>
-        </p:spPr>
-        <p:style>
-          <a:lnRef idx="2">
-            <a:schemeClr val="accent1">
-              <a:shade val="50000"/>
-            </a:schemeClr>
-          </a:lnRef>
-          <a:fillRef idx="1">
-            <a:schemeClr val="accent1"/>
-          </a:fillRef>
-          <a:effectRef idx="0">
-            <a:schemeClr val="accent1"/>
-          </a:effectRef>
-          <a:fontRef idx="minor">
-            <a:schemeClr val="lt1"/>
-          </a:fontRef>
-        </p:style>
-        <p:txBody>
-          <a:bodyPr rtlCol="0" anchor="ctr"/>
-          <a:lstStyle/>
-          <a:p>
-            <a:pPr algn="ctr"/>
-            <a:endParaRPr kumimoji="1" lang="ja-JP" altLang="en-US"/>
-          </a:p>
-        </p:txBody>
-      </p:sp>
-      <p:sp>
-        <p:nvSpPr>
-          <p:cNvPr id="38" name="フローチャート : 書類 37"/>
-          <p:cNvSpPr/>
-          <p:nvPr/>
-        </p:nvSpPr>
-        <p:spPr>
-          <a:xfrm>
-            <a:off x="5436096" y="2996952"/>
-            <a:ext cx="936104" cy="547446"/>
-          </a:xfrm>
-          <a:prstGeom prst="flowChartDocument">
-            <a:avLst/>
-          </a:prstGeom>
-        </p:spPr>
-        <p:style>
-          <a:lnRef idx="2">
-            <a:schemeClr val="accent1">
-              <a:shade val="50000"/>
-            </a:schemeClr>
-          </a:lnRef>
-          <a:fillRef idx="1">
-            <a:schemeClr val="accent1"/>
-          </a:fillRef>
-          <a:effectRef idx="0">
-            <a:schemeClr val="accent1"/>
-          </a:effectRef>
-          <a:fontRef idx="minor">
-            <a:schemeClr val="lt1"/>
-          </a:fontRef>
-        </p:style>
-        <p:txBody>
-          <a:bodyPr rtlCol="0" anchor="ctr"/>
-          <a:lstStyle/>
-          <a:p>
-            <a:pPr algn="ctr"/>
-            <a:r>
-              <a:rPr lang="en-US" altLang="ja-JP" sz="1400" dirty="0" err="1" smtClean="0"/>
-              <a:t>ciphertext</a:t>
-            </a:r>
-            <a:endParaRPr kumimoji="1" lang="ja-JP" altLang="en-US" sz="1400" dirty="0"/>
-          </a:p>
-        </p:txBody>
-      </p:sp>
-      <p:sp>
-        <p:nvSpPr>
-          <p:cNvPr id="39" name="フローチャート : 書類 38"/>
-          <p:cNvSpPr/>
-          <p:nvPr/>
-        </p:nvSpPr>
-        <p:spPr>
-          <a:xfrm>
-            <a:off x="7380312" y="2996952"/>
-            <a:ext cx="936104" cy="547446"/>
-          </a:xfrm>
-          <a:prstGeom prst="flowChartDocument">
-            <a:avLst/>
-          </a:prstGeom>
-          <a:noFill/>
-        </p:spPr>
-        <p:style>
-          <a:lnRef idx="2">
-            <a:schemeClr val="accent1">
-              <a:shade val="50000"/>
-            </a:schemeClr>
-          </a:lnRef>
-          <a:fillRef idx="1">
-            <a:schemeClr val="accent1"/>
-          </a:fillRef>
-          <a:effectRef idx="0">
-            <a:schemeClr val="accent1"/>
-          </a:effectRef>
-          <a:fontRef idx="minor">
-            <a:schemeClr val="lt1"/>
-          </a:fontRef>
-        </p:style>
-        <p:txBody>
-          <a:bodyPr rtlCol="0" anchor="ctr"/>
-          <a:lstStyle/>
-          <a:p>
-            <a:pPr algn="ctr"/>
-            <a:r>
-              <a:rPr kumimoji="1" lang="en-US" altLang="ja-JP" sz="1400" dirty="0" smtClean="0">
-                <a:solidFill>
-                  <a:schemeClr val="tx1"/>
-                </a:solidFill>
-              </a:rPr>
-              <a:t>plaintext</a:t>
-            </a:r>
-            <a:endParaRPr kumimoji="1" lang="ja-JP" altLang="en-US" sz="1400" dirty="0">
-              <a:solidFill>
-                <a:schemeClr val="tx1"/>
-              </a:solidFill>
-            </a:endParaRPr>
-          </a:p>
-        </p:txBody>
-      </p:sp>
-      <p:sp>
-        <p:nvSpPr>
-          <p:cNvPr id="40" name="右矢印 39"/>
-          <p:cNvSpPr/>
-          <p:nvPr/>
-        </p:nvSpPr>
-        <p:spPr>
-          <a:xfrm>
-            <a:off x="6056838" y="2106606"/>
-            <a:ext cx="380833" cy="229034"/>
-          </a:xfrm>
-          <a:prstGeom prst="rightArrow">
-            <a:avLst/>
-          </a:prstGeom>
-        </p:spPr>
-        <p:style>
-          <a:lnRef idx="2">
-            <a:schemeClr val="accent1">
-              <a:shade val="50000"/>
-            </a:schemeClr>
-          </a:lnRef>
-          <a:fillRef idx="1">
-            <a:schemeClr val="accent1"/>
-          </a:fillRef>
-          <a:effectRef idx="0">
-            <a:schemeClr val="accent1"/>
-          </a:effectRef>
-          <a:fontRef idx="minor">
-            <a:schemeClr val="lt1"/>
-          </a:fontRef>
-        </p:style>
-        <p:txBody>
-          <a:bodyPr rtlCol="0" anchor="ctr"/>
-          <a:lstStyle/>
-          <a:p>
-            <a:pPr algn="ctr"/>
-            <a:endParaRPr kumimoji="1" lang="ja-JP" altLang="en-US"/>
-          </a:p>
-        </p:txBody>
-      </p:sp>
-      <p:sp>
-        <p:nvSpPr>
-          <p:cNvPr id="41" name="右矢印 40"/>
-          <p:cNvSpPr/>
-          <p:nvPr/>
-        </p:nvSpPr>
-        <p:spPr>
-          <a:xfrm>
-            <a:off x="6473711" y="3094879"/>
-            <a:ext cx="792088" cy="242316"/>
-          </a:xfrm>
-          <a:prstGeom prst="rightArrow">
-            <a:avLst/>
-          </a:prstGeom>
-        </p:spPr>
-        <p:style>
-          <a:lnRef idx="2">
-            <a:schemeClr val="accent1">
-              <a:shade val="50000"/>
-            </a:schemeClr>
-          </a:lnRef>
-          <a:fillRef idx="1">
-            <a:schemeClr val="accent1"/>
-          </a:fillRef>
-          <a:effectRef idx="0">
-            <a:schemeClr val="accent1"/>
-          </a:effectRef>
-          <a:fontRef idx="minor">
-            <a:schemeClr val="lt1"/>
-          </a:fontRef>
-        </p:style>
-        <p:txBody>
-          <a:bodyPr rtlCol="0" anchor="ctr"/>
-          <a:lstStyle/>
-          <a:p>
-            <a:pPr algn="ctr"/>
-            <a:endParaRPr kumimoji="1" lang="ja-JP" altLang="en-US"/>
-          </a:p>
-        </p:txBody>
-      </p:sp>
-      <p:sp>
-        <p:nvSpPr>
-          <p:cNvPr id="42" name="下矢印 41"/>
-          <p:cNvSpPr/>
-          <p:nvPr/>
-        </p:nvSpPr>
-        <p:spPr>
-          <a:xfrm>
-            <a:off x="6908966" y="2605933"/>
-            <a:ext cx="180020" cy="432048"/>
-          </a:xfrm>
-          <a:prstGeom prst="downArrow">
-            <a:avLst/>
-          </a:prstGeom>
-        </p:spPr>
-        <p:style>
-          <a:lnRef idx="2">
-            <a:schemeClr val="accent1">
-              <a:shade val="50000"/>
-            </a:schemeClr>
-          </a:lnRef>
-          <a:fillRef idx="1">
-            <a:schemeClr val="accent1"/>
-          </a:fillRef>
-          <a:effectRef idx="0">
-            <a:schemeClr val="accent1"/>
-          </a:effectRef>
-          <a:fontRef idx="minor">
-            <a:schemeClr val="lt1"/>
-          </a:fontRef>
-        </p:style>
-        <p:txBody>
-          <a:bodyPr rtlCol="0" anchor="ctr"/>
-          <a:lstStyle/>
-          <a:p>
-            <a:pPr algn="ctr"/>
-            <a:endParaRPr kumimoji="1" lang="ja-JP" altLang="en-US"/>
-          </a:p>
-        </p:txBody>
-      </p:sp>
-      <p:sp>
-        <p:nvSpPr>
-          <p:cNvPr id="43" name="右矢印 42"/>
-          <p:cNvSpPr/>
-          <p:nvPr/>
-        </p:nvSpPr>
-        <p:spPr>
-          <a:xfrm>
-            <a:off x="3949535" y="2149590"/>
-            <a:ext cx="1070272" cy="229034"/>
-          </a:xfrm>
-          <a:prstGeom prst="rightArrow">
-            <a:avLst/>
-          </a:prstGeom>
-        </p:spPr>
-        <p:style>
-          <a:lnRef idx="2">
-            <a:schemeClr val="accent3">
-              <a:shade val="50000"/>
-            </a:schemeClr>
-          </a:lnRef>
-          <a:fillRef idx="1">
-            <a:schemeClr val="accent3"/>
-          </a:fillRef>
-          <a:effectRef idx="0">
-            <a:schemeClr val="accent3"/>
-          </a:effectRef>
-          <a:fontRef idx="minor">
-            <a:schemeClr val="lt1"/>
-          </a:fontRef>
-        </p:style>
-        <p:txBody>
-          <a:bodyPr rtlCol="0" anchor="ctr"/>
-          <a:lstStyle/>
-          <a:p>
-            <a:pPr algn="ctr"/>
-            <a:endParaRPr kumimoji="1" lang="ja-JP" altLang="en-US"/>
-          </a:p>
-        </p:txBody>
-      </p:sp>
-      <p:sp>
-        <p:nvSpPr>
-          <p:cNvPr id="44" name="右矢印 43"/>
-          <p:cNvSpPr/>
-          <p:nvPr/>
-        </p:nvSpPr>
-        <p:spPr>
-          <a:xfrm>
-            <a:off x="3949535" y="3140968"/>
-            <a:ext cx="1129476" cy="229034"/>
-          </a:xfrm>
-          <a:prstGeom prst="rightArrow">
-            <a:avLst/>
-          </a:prstGeom>
-        </p:spPr>
-        <p:style>
-          <a:lnRef idx="2">
-            <a:schemeClr val="accent3">
-              <a:shade val="50000"/>
-            </a:schemeClr>
-          </a:lnRef>
-          <a:fillRef idx="1">
-            <a:schemeClr val="accent3"/>
-          </a:fillRef>
-          <a:effectRef idx="0">
-            <a:schemeClr val="accent3"/>
-          </a:effectRef>
-          <a:fontRef idx="minor">
-            <a:schemeClr val="lt1"/>
-          </a:fontRef>
-        </p:style>
-        <p:txBody>
-          <a:bodyPr rtlCol="0" anchor="ctr"/>
-          <a:lstStyle/>
-          <a:p>
-            <a:pPr algn="ctr"/>
-            <a:endParaRPr kumimoji="1" lang="ja-JP" altLang="en-US"/>
-          </a:p>
-        </p:txBody>
-      </p:sp>
-      <p:sp>
-        <p:nvSpPr>
-          <p:cNvPr id="45" name="テキスト ボックス 44"/>
-          <p:cNvSpPr txBox="1"/>
-          <p:nvPr/>
-        </p:nvSpPr>
-        <p:spPr>
-          <a:xfrm>
-            <a:off x="1108498" y="1979548"/>
-            <a:ext cx="871214" cy="369332"/>
-          </a:xfrm>
-          <a:prstGeom prst="rect">
-            <a:avLst/>
-          </a:prstGeom>
-          <a:noFill/>
-        </p:spPr>
-        <p:txBody>
-          <a:bodyPr wrap="square" rtlCol="0">
-            <a:spAutoFit/>
-          </a:bodyPr>
-          <a:lstStyle/>
-          <a:p>
-            <a:r>
-              <a:rPr kumimoji="1" lang="ja-JP" altLang="en-US" dirty="0" smtClean="0"/>
-              <a:t>①</a:t>
-            </a:r>
-            <a:endParaRPr kumimoji="1" lang="ja-JP" altLang="en-US" dirty="0"/>
-          </a:p>
-        </p:txBody>
-      </p:sp>
-      <p:sp>
-        <p:nvSpPr>
-          <p:cNvPr id="46" name="テキスト ボックス 45"/>
-          <p:cNvSpPr txBox="1"/>
-          <p:nvPr/>
-        </p:nvSpPr>
-        <p:spPr>
-          <a:xfrm>
-            <a:off x="1688121" y="3429000"/>
-            <a:ext cx="871214" cy="369332"/>
-          </a:xfrm>
-          <a:prstGeom prst="rect">
-            <a:avLst/>
-          </a:prstGeom>
-          <a:noFill/>
-        </p:spPr>
-        <p:txBody>
-          <a:bodyPr wrap="square" rtlCol="0">
-            <a:spAutoFit/>
-          </a:bodyPr>
-          <a:lstStyle/>
-          <a:p>
-            <a:r>
-              <a:rPr lang="ja-JP" altLang="en-US" dirty="0"/>
-              <a:t>②</a:t>
-            </a:r>
-            <a:endParaRPr kumimoji="1" lang="ja-JP" altLang="en-US" dirty="0"/>
-          </a:p>
-        </p:txBody>
-      </p:sp>
-      <p:sp>
-        <p:nvSpPr>
-          <p:cNvPr id="48" name="テキスト ボックス 47"/>
-          <p:cNvSpPr txBox="1"/>
-          <p:nvPr/>
-        </p:nvSpPr>
-        <p:spPr>
-          <a:xfrm>
-            <a:off x="4067944" y="2574776"/>
-            <a:ext cx="871214" cy="369332"/>
-          </a:xfrm>
-          <a:prstGeom prst="rect">
-            <a:avLst/>
-          </a:prstGeom>
-          <a:noFill/>
-        </p:spPr>
-        <p:txBody>
-          <a:bodyPr wrap="square" rtlCol="0">
-            <a:spAutoFit/>
-          </a:bodyPr>
-          <a:lstStyle/>
-          <a:p>
-            <a:r>
-              <a:rPr lang="ja-JP" altLang="en-US" dirty="0" smtClean="0"/>
-              <a:t>④</a:t>
-            </a:r>
-            <a:endParaRPr kumimoji="1" lang="ja-JP" altLang="en-US" dirty="0"/>
-          </a:p>
-        </p:txBody>
-      </p:sp>
-      <p:sp>
-        <p:nvSpPr>
-          <p:cNvPr id="49" name="テキスト ボックス 48"/>
-          <p:cNvSpPr txBox="1"/>
-          <p:nvPr/>
-        </p:nvSpPr>
-        <p:spPr>
-          <a:xfrm>
-            <a:off x="6365782" y="1721852"/>
-            <a:ext cx="871214" cy="369332"/>
-          </a:xfrm>
-          <a:prstGeom prst="rect">
-            <a:avLst/>
-          </a:prstGeom>
-          <a:noFill/>
-        </p:spPr>
-        <p:txBody>
-          <a:bodyPr wrap="square" rtlCol="0">
-            <a:spAutoFit/>
-          </a:bodyPr>
-          <a:lstStyle/>
-          <a:p>
-            <a:r>
-              <a:rPr lang="ja-JP" altLang="en-US" dirty="0" smtClean="0"/>
-              <a:t>⑤</a:t>
-            </a:r>
-            <a:endParaRPr kumimoji="1" lang="ja-JP" altLang="en-US" dirty="0"/>
-          </a:p>
-        </p:txBody>
-      </p:sp>
-      <p:sp>
-        <p:nvSpPr>
-          <p:cNvPr id="50" name="テキスト ボックス 49"/>
-          <p:cNvSpPr txBox="1"/>
-          <p:nvPr/>
-        </p:nvSpPr>
-        <p:spPr>
-          <a:xfrm>
-            <a:off x="6804248" y="3347700"/>
-            <a:ext cx="871214" cy="369332"/>
-          </a:xfrm>
-          <a:prstGeom prst="rect">
-            <a:avLst/>
-          </a:prstGeom>
-          <a:noFill/>
-        </p:spPr>
-        <p:txBody>
-          <a:bodyPr wrap="square" rtlCol="0">
-            <a:spAutoFit/>
-          </a:bodyPr>
-          <a:lstStyle/>
-          <a:p>
-            <a:r>
-              <a:rPr lang="ja-JP" altLang="en-US" dirty="0" smtClean="0"/>
-              <a:t>⑥</a:t>
-            </a:r>
-            <a:endParaRPr kumimoji="1" lang="ja-JP" altLang="en-US" dirty="0"/>
           </a:p>
         </p:txBody>
       </p:sp>
       <p:grpSp>
         <p:nvGrpSpPr>
-          <p:cNvPr id="9" name="グループ化 8"/>
+          <p:cNvPr id="76" name="グループ化 18"/>
           <p:cNvGrpSpPr/>
           <p:nvPr/>
         </p:nvGrpSpPr>
         <p:grpSpPr>
           <a:xfrm>
-            <a:off x="2965008" y="1818696"/>
-            <a:ext cx="888935" cy="792088"/>
-            <a:chOff x="2559335" y="4652073"/>
-            <a:chExt cx="888935" cy="792088"/>
+            <a:off x="5307407" y="2627573"/>
+            <a:ext cx="809111" cy="228917"/>
+            <a:chOff x="2559687" y="4252086"/>
+            <a:chExt cx="809110" cy="228917"/>
           </a:xfrm>
         </p:grpSpPr>
-        <p:pic>
-          <p:nvPicPr>
-            <p:cNvPr id="51" name="Picture 6" descr="C:\Users\btsatoukzn\AppData\Local\Microsoft\Windows\Temporary Internet Files\Content.IE5\OBY1ZMWA\sgi01a201411140000[1].jpg"/>
-            <p:cNvPicPr>
-              <a:picLocks noChangeAspect="1" noChangeArrowheads="1"/>
-            </p:cNvPicPr>
-            <p:nvPr/>
-          </p:nvPicPr>
-          <p:blipFill>
-            <a:blip r:embed="rId3" cstate="print">
-              <a:extLst>
-                <a:ext uri="{28A0092B-C50C-407E-A947-70E740481C1C}">
-                  <a14:useLocalDpi xmlns:a14="http://schemas.microsoft.com/office/drawing/2010/main" val="0"/>
-                </a:ext>
-              </a:extLst>
-            </a:blip>
-            <a:srcRect/>
-            <a:stretch>
-              <a:fillRect/>
-            </a:stretch>
-          </p:blipFill>
-          <p:spPr bwMode="auto">
-            <a:xfrm>
-              <a:off x="2609782" y="4652073"/>
-              <a:ext cx="792088" cy="792088"/>
-            </a:xfrm>
-            <a:prstGeom prst="rect">
-              <a:avLst/>
-            </a:prstGeom>
-            <a:noFill/>
-            <a:extLst>
-              <a:ext uri="{909E8E84-426E-40DD-AFC4-6F175D3DCCD1}">
-                <a14:hiddenFill xmlns:a14="http://schemas.microsoft.com/office/drawing/2010/main">
-                  <a:solidFill>
-                    <a:srgbClr val="FFFFFF"/>
-                  </a:solidFill>
-                </a14:hiddenFill>
-              </a:ext>
-            </a:extLst>
-          </p:spPr>
-        </p:pic>
         <p:sp>
           <p:nvSpPr>
-            <p:cNvPr id="3" name="正方形/長方形 2"/>
+            <p:cNvPr id="77" name="正方形/長方形 76"/>
             <p:cNvSpPr/>
             <p:nvPr/>
           </p:nvSpPr>
           <p:spPr>
             <a:xfrm>
-              <a:off x="2559335" y="4797152"/>
-              <a:ext cx="888935" cy="504056"/>
+              <a:off x="2559687" y="4324094"/>
+              <a:ext cx="697264" cy="72008"/>
             </a:xfrm>
             <a:prstGeom prst="rect">
               <a:avLst/>
             </a:prstGeom>
             <a:solidFill>
+              <a:schemeClr val="accent6"/>
+            </a:solidFill>
+            <a:ln>
+              <a:noFill/>
+            </a:ln>
+          </p:spPr>
+          <p:style>
+            <a:lnRef idx="2">
               <a:schemeClr val="accent1">
-                <a:alpha val="48000"/>
+                <a:shade val="50000"/>
               </a:schemeClr>
+            </a:lnRef>
+            <a:fillRef idx="1">
+              <a:schemeClr val="accent1"/>
+            </a:fillRef>
+            <a:effectRef idx="0">
+              <a:schemeClr val="accent1"/>
+            </a:effectRef>
+            <a:fontRef idx="minor">
+              <a:schemeClr val="lt1"/>
+            </a:fontRef>
+          </p:style>
+          <p:txBody>
+            <a:bodyPr rtlCol="0" anchor="ctr"/>
+            <a:lstStyle/>
+            <a:p>
+              <a:pPr algn="ctr"/>
+              <a:endParaRPr kumimoji="1" lang="ja-JP" altLang="en-US"/>
+            </a:p>
+          </p:txBody>
+        </p:sp>
+        <p:sp>
+          <p:nvSpPr>
+            <p:cNvPr id="78" name="二等辺三角形 77"/>
+            <p:cNvSpPr/>
+            <p:nvPr/>
+          </p:nvSpPr>
+          <p:spPr>
+            <a:xfrm>
+              <a:off x="2559687" y="4336987"/>
+              <a:ext cx="144016" cy="144016"/>
+            </a:xfrm>
+            <a:prstGeom prst="triangle">
+              <a:avLst/>
+            </a:prstGeom>
+            <a:solidFill>
+              <a:schemeClr val="accent6"/>
+            </a:solidFill>
+            <a:ln>
+              <a:noFill/>
+            </a:ln>
+          </p:spPr>
+          <p:style>
+            <a:lnRef idx="2">
+              <a:schemeClr val="accent1">
+                <a:shade val="50000"/>
+              </a:schemeClr>
+            </a:lnRef>
+            <a:fillRef idx="1">
+              <a:schemeClr val="accent1"/>
+            </a:fillRef>
+            <a:effectRef idx="0">
+              <a:schemeClr val="accent1"/>
+            </a:effectRef>
+            <a:fontRef idx="minor">
+              <a:schemeClr val="lt1"/>
+            </a:fontRef>
+          </p:style>
+          <p:txBody>
+            <a:bodyPr rtlCol="0" anchor="ctr"/>
+            <a:lstStyle/>
+            <a:p>
+              <a:pPr algn="ctr"/>
+              <a:endParaRPr kumimoji="1" lang="ja-JP" altLang="en-US"/>
+            </a:p>
+          </p:txBody>
+        </p:sp>
+        <p:sp>
+          <p:nvSpPr>
+            <p:cNvPr id="79" name="正方形/長方形 78"/>
+            <p:cNvSpPr/>
+            <p:nvPr/>
+          </p:nvSpPr>
+          <p:spPr>
+            <a:xfrm>
+              <a:off x="3128880" y="4252086"/>
+              <a:ext cx="239917" cy="216024"/>
+            </a:xfrm>
+            <a:prstGeom prst="rect">
+              <a:avLst/>
+            </a:prstGeom>
+            <a:solidFill>
+              <a:schemeClr val="accent6"/>
             </a:solidFill>
             <a:ln>
               <a:noFill/>
@@ -6822,120 +5812,58 @@
           </p:txBody>
         </p:sp>
       </p:grpSp>
-      <p:grpSp>
-        <p:nvGrpSpPr>
-          <p:cNvPr id="52" name="グループ化 51"/>
-          <p:cNvGrpSpPr/>
+      <p:sp>
+        <p:nvSpPr>
+          <p:cNvPr id="4" name="正方形/長方形 3"/>
+          <p:cNvSpPr/>
           <p:nvPr/>
-        </p:nvGrpSpPr>
-        <p:grpSpPr>
-          <a:xfrm>
-            <a:off x="5096451" y="1808324"/>
-            <a:ext cx="888935" cy="792088"/>
-            <a:chOff x="2559335" y="4652073"/>
-            <a:chExt cx="888935" cy="792088"/>
-          </a:xfrm>
-        </p:grpSpPr>
-        <p:pic>
-          <p:nvPicPr>
-            <p:cNvPr id="53" name="Picture 6" descr="C:\Users\btsatoukzn\AppData\Local\Microsoft\Windows\Temporary Internet Files\Content.IE5\OBY1ZMWA\sgi01a201411140000[1].jpg"/>
-            <p:cNvPicPr>
-              <a:picLocks noChangeAspect="1" noChangeArrowheads="1"/>
-            </p:cNvPicPr>
-            <p:nvPr/>
-          </p:nvPicPr>
-          <p:blipFill>
-            <a:blip r:embed="rId3" cstate="print">
-              <a:extLst>
-                <a:ext uri="{28A0092B-C50C-407E-A947-70E740481C1C}">
-                  <a14:useLocalDpi xmlns:a14="http://schemas.microsoft.com/office/drawing/2010/main" val="0"/>
-                </a:ext>
-              </a:extLst>
-            </a:blip>
-            <a:srcRect/>
-            <a:stretch>
-              <a:fillRect/>
-            </a:stretch>
-          </p:blipFill>
-          <p:spPr bwMode="auto">
-            <a:xfrm>
-              <a:off x="2609782" y="4652073"/>
-              <a:ext cx="792088" cy="792088"/>
-            </a:xfrm>
-            <a:prstGeom prst="rect">
-              <a:avLst/>
-            </a:prstGeom>
-            <a:noFill/>
-            <a:extLst>
-              <a:ext uri="{909E8E84-426E-40DD-AFC4-6F175D3DCCD1}">
-                <a14:hiddenFill xmlns:a14="http://schemas.microsoft.com/office/drawing/2010/main">
-                  <a:solidFill>
-                    <a:srgbClr val="FFFFFF"/>
-                  </a:solidFill>
-                </a14:hiddenFill>
-              </a:ext>
-            </a:extLst>
-          </p:spPr>
-        </p:pic>
-        <p:sp>
-          <p:nvSpPr>
-            <p:cNvPr id="54" name="正方形/長方形 53"/>
-            <p:cNvSpPr/>
-            <p:nvPr/>
-          </p:nvSpPr>
-          <p:spPr>
-            <a:xfrm>
-              <a:off x="2559335" y="4797152"/>
-              <a:ext cx="888935" cy="504056"/>
-            </a:xfrm>
-            <a:prstGeom prst="rect">
-              <a:avLst/>
-            </a:prstGeom>
-            <a:solidFill>
-              <a:schemeClr val="accent1">
-                <a:alpha val="48000"/>
-              </a:schemeClr>
-            </a:solidFill>
-            <a:ln>
-              <a:noFill/>
-            </a:ln>
-          </p:spPr>
-          <p:style>
-            <a:lnRef idx="2">
-              <a:schemeClr val="accent1">
-                <a:shade val="50000"/>
-              </a:schemeClr>
-            </a:lnRef>
-            <a:fillRef idx="1">
-              <a:schemeClr val="accent1"/>
-            </a:fillRef>
-            <a:effectRef idx="0">
-              <a:schemeClr val="accent1"/>
-            </a:effectRef>
-            <a:fontRef idx="minor">
-              <a:schemeClr val="lt1"/>
-            </a:fontRef>
-          </p:style>
-          <p:txBody>
-            <a:bodyPr rtlCol="0" anchor="ctr"/>
-            <a:lstStyle/>
-            <a:p>
-              <a:pPr algn="ctr"/>
-              <a:endParaRPr kumimoji="1" lang="ja-JP" altLang="en-US"/>
-            </a:p>
-          </p:txBody>
-        </p:sp>
-      </p:grpSp>
-      <p:sp>
-        <p:nvSpPr>
-          <p:cNvPr id="33" name="テキスト ボックス 32"/>
+        </p:nvSpPr>
+        <p:spPr>
+          <a:xfrm>
+            <a:off x="5217376" y="2204864"/>
+            <a:ext cx="2081200" cy="986408"/>
+          </a:xfrm>
+          <a:prstGeom prst="rect">
+            <a:avLst/>
+          </a:prstGeom>
+          <a:noFill/>
+          <a:ln w="3175" cmpd="sng">
+            <a:prstDash val="dot"/>
+          </a:ln>
+        </p:spPr>
+        <p:style>
+          <a:lnRef idx="2">
+            <a:schemeClr val="dk1"/>
+          </a:lnRef>
+          <a:fillRef idx="1">
+            <a:schemeClr val="lt1"/>
+          </a:fillRef>
+          <a:effectRef idx="0">
+            <a:schemeClr val="dk1"/>
+          </a:effectRef>
+          <a:fontRef idx="minor">
+            <a:schemeClr val="dk1"/>
+          </a:fontRef>
+        </p:style>
+        <p:txBody>
+          <a:bodyPr rtlCol="0" anchor="ctr"/>
+          <a:lstStyle/>
+          <a:p>
+            <a:pPr algn="ctr"/>
+            <a:endParaRPr kumimoji="1" lang="ja-JP" altLang="en-US"/>
+          </a:p>
+        </p:txBody>
+      </p:sp>
+      <p:sp>
+        <p:nvSpPr>
+          <p:cNvPr id="81" name="テキスト ボックス 80"/>
           <p:cNvSpPr txBox="1"/>
           <p:nvPr/>
         </p:nvSpPr>
         <p:spPr>
           <a:xfrm>
-            <a:off x="4932040" y="2401143"/>
-            <a:ext cx="1383363" cy="307777"/>
+            <a:off x="5865448" y="2204864"/>
+            <a:ext cx="1145096" cy="307777"/>
           </a:xfrm>
           <a:prstGeom prst="rect">
             <a:avLst/>
@@ -6949,8 +5877,8 @@
           <a:lstStyle/>
           <a:p>
             <a:r>
-              <a:rPr lang="en-US" altLang="ja-JP" sz="1400" dirty="0" smtClean="0"/>
-              <a:t>Encrypted key</a:t>
+              <a:rPr kumimoji="1" lang="en-US" altLang="ja-JP" sz="1400" dirty="0" smtClean="0"/>
+              <a:t>Key Pair</a:t>
             </a:r>
             <a:endParaRPr kumimoji="1" lang="ja-JP" altLang="en-US" sz="1400" dirty="0"/>
           </a:p>
@@ -6958,14 +5886,14 @@
       </p:sp>
       <p:sp>
         <p:nvSpPr>
-          <p:cNvPr id="47" name="テキスト ボックス 46"/>
+          <p:cNvPr id="82" name="テキスト ボックス 81"/>
           <p:cNvSpPr txBox="1"/>
           <p:nvPr/>
         </p:nvSpPr>
         <p:spPr>
           <a:xfrm>
-            <a:off x="3059832" y="1619508"/>
-            <a:ext cx="871214" cy="369332"/>
+            <a:off x="1475656" y="1268760"/>
+            <a:ext cx="1152128" cy="830997"/>
           </a:xfrm>
           <a:prstGeom prst="rect">
             <a:avLst/>
@@ -6978,24 +5906,32 @@
           </a:bodyPr>
           <a:lstStyle/>
           <a:p>
-            <a:r>
-              <a:rPr lang="ja-JP" altLang="en-US" dirty="0" smtClean="0"/>
-              <a:t>③</a:t>
-            </a:r>
-            <a:endParaRPr kumimoji="1" lang="ja-JP" altLang="en-US" dirty="0"/>
-          </a:p>
-        </p:txBody>
-      </p:sp>
-      <p:sp>
-        <p:nvSpPr>
-          <p:cNvPr id="25" name="テキスト ボックス 24"/>
+            <a:pPr algn="ctr"/>
+            <a:r>
+              <a:rPr kumimoji="1" lang="en-US" altLang="ja-JP" sz="2400" dirty="0" smtClean="0"/>
+              <a:t>Sender</a:t>
+            </a:r>
+          </a:p>
+          <a:p>
+            <a:pPr algn="ctr"/>
+            <a:r>
+              <a:rPr lang="en-US" altLang="ja-JP" sz="2400" dirty="0" smtClean="0"/>
+              <a:t>(Client)</a:t>
+            </a:r>
+            <a:endParaRPr kumimoji="1" lang="ja-JP" altLang="en-US" sz="2400" dirty="0"/>
+          </a:p>
+        </p:txBody>
+      </p:sp>
+      <p:sp>
+        <p:nvSpPr>
+          <p:cNvPr id="83" name="テキスト ボックス 82"/>
           <p:cNvSpPr txBox="1"/>
           <p:nvPr/>
         </p:nvSpPr>
         <p:spPr>
           <a:xfrm>
-            <a:off x="2756589" y="2420888"/>
-            <a:ext cx="1383363" cy="307777"/>
+            <a:off x="6372200" y="1268760"/>
+            <a:ext cx="1656184" cy="830997"/>
           </a:xfrm>
           <a:prstGeom prst="rect">
             <a:avLst/>
@@ -7008,145 +5944,95 @@
           </a:bodyPr>
           <a:lstStyle/>
           <a:p>
-            <a:r>
-              <a:rPr lang="en-US" altLang="ja-JP" sz="1400" dirty="0" smtClean="0"/>
-              <a:t>Encrypted key</a:t>
-            </a:r>
-            <a:endParaRPr kumimoji="1" lang="ja-JP" altLang="en-US" sz="1400" dirty="0"/>
-          </a:p>
-        </p:txBody>
-      </p:sp>
-    </p:spTree>
-    <p:extLst>
-      <p:ext uri="{BB962C8B-B14F-4D97-AF65-F5344CB8AC3E}">
-        <p14:creationId xmlns:p14="http://schemas.microsoft.com/office/powerpoint/2010/main" val="3782642232"/>
-      </p:ext>
-    </p:extLst>
-  </p:cSld>
-  <p:clrMapOvr>
-    <a:masterClrMapping/>
-  </p:clrMapOvr>
-</p:sld>
-</file>
-
-<file path=ppt/slides/slide3.xml><?xml version="1.0" encoding="utf-8"?>
-<p:sld xmlns:a="http://schemas.openxmlformats.org/drawingml/2006/main" xmlns:r="http://schemas.openxmlformats.org/officeDocument/2006/relationships" xmlns:p="http://schemas.openxmlformats.org/presentationml/2006/main">
-  <p:cSld>
-    <p:spTree>
-      <p:nvGrpSpPr>
-        <p:cNvPr id="1" name=""/>
-        <p:cNvGrpSpPr/>
-        <p:nvPr/>
-      </p:nvGrpSpPr>
-      <p:grpSpPr>
-        <a:xfrm>
-          <a:off x="0" y="0"/>
-          <a:ext cx="0" cy="0"/>
-          <a:chOff x="0" y="0"/>
-          <a:chExt cx="0" cy="0"/>
-        </a:xfrm>
-      </p:grpSpPr>
-      <p:pic>
-        <p:nvPicPr>
-          <p:cNvPr id="4" name="Picture 5" descr="C:\Users\btsatoukzn\AppData\Local\Microsoft\Windows\Temporary Internet Files\Content.IE5\3TY4A3CC\220px-Llave_bronce[1].jpg"/>
-          <p:cNvPicPr>
-            <a:picLocks noChangeAspect="1" noChangeArrowheads="1"/>
-          </p:cNvPicPr>
+            <a:pPr algn="ctr"/>
+            <a:r>
+              <a:rPr kumimoji="1" lang="en-US" altLang="ja-JP" sz="2400" dirty="0" smtClean="0"/>
+              <a:t>Receiver</a:t>
+            </a:r>
+          </a:p>
+          <a:p>
+            <a:pPr algn="ctr"/>
+            <a:r>
+              <a:rPr lang="en-US" altLang="ja-JP" sz="2400" dirty="0" smtClean="0"/>
+              <a:t>(Server)</a:t>
+            </a:r>
+            <a:endParaRPr kumimoji="1" lang="ja-JP" altLang="en-US" sz="2400" dirty="0"/>
+          </a:p>
+        </p:txBody>
+      </p:sp>
+      <p:sp>
+        <p:nvSpPr>
+          <p:cNvPr id="84" name="正方形/長方形 83"/>
+          <p:cNvSpPr/>
           <p:nvPr/>
-        </p:nvPicPr>
-        <p:blipFill>
-          <a:blip r:embed="rId2">
-            <a:extLst>
-              <a:ext uri="{28A0092B-C50C-407E-A947-70E740481C1C}">
-                <a14:useLocalDpi xmlns:a14="http://schemas.microsoft.com/office/drawing/2010/main" val="0"/>
-              </a:ext>
-            </a:extLst>
-          </a:blip>
-          <a:srcRect/>
-          <a:stretch>
-            <a:fillRect/>
-          </a:stretch>
-        </p:blipFill>
-        <p:spPr bwMode="auto">
-          <a:xfrm rot="5400000">
-            <a:off x="5765348" y="594679"/>
-            <a:ext cx="1024808" cy="1364858"/>
+        </p:nvSpPr>
+        <p:spPr>
+          <a:xfrm>
+            <a:off x="323528" y="1268760"/>
+            <a:ext cx="3600400" cy="4536504"/>
           </a:xfrm>
           <a:prstGeom prst="rect">
             <a:avLst/>
           </a:prstGeom>
           <a:noFill/>
-          <a:extLst>
-            <a:ext uri="{909E8E84-426E-40DD-AFC4-6F175D3DCCD1}">
-              <a14:hiddenFill xmlns:a14="http://schemas.microsoft.com/office/drawing/2010/main">
-                <a:solidFill>
-                  <a:srgbClr val="FFFFFF"/>
-                </a:solidFill>
-              </a14:hiddenFill>
-            </a:ext>
-          </a:extLst>
+          <a:ln w="3175" cmpd="sng">
+            <a:prstDash val="dash"/>
+          </a:ln>
         </p:spPr>
-      </p:pic>
-      <p:sp>
-        <p:nvSpPr>
-          <p:cNvPr id="5" name="テキスト ボックス 4"/>
-          <p:cNvSpPr txBox="1"/>
+        <p:style>
+          <a:lnRef idx="2">
+            <a:schemeClr val="dk1"/>
+          </a:lnRef>
+          <a:fillRef idx="1">
+            <a:schemeClr val="lt1"/>
+          </a:fillRef>
+          <a:effectRef idx="0">
+            <a:schemeClr val="dk1"/>
+          </a:effectRef>
+          <a:fontRef idx="minor">
+            <a:schemeClr val="dk1"/>
+          </a:fontRef>
+        </p:style>
+        <p:txBody>
+          <a:bodyPr rtlCol="0" anchor="ctr"/>
+          <a:lstStyle/>
+          <a:p>
+            <a:pPr algn="ctr"/>
+            <a:endParaRPr kumimoji="1" lang="ja-JP" altLang="en-US"/>
+          </a:p>
+        </p:txBody>
+      </p:sp>
+      <p:sp>
+        <p:nvSpPr>
+          <p:cNvPr id="85" name="正方形/長方形 84"/>
+          <p:cNvSpPr/>
           <p:nvPr/>
         </p:nvSpPr>
         <p:spPr>
           <a:xfrm>
-            <a:off x="5739339" y="1425004"/>
-            <a:ext cx="1145096" cy="307777"/>
+            <a:off x="5148064" y="1268760"/>
+            <a:ext cx="3816424" cy="4536504"/>
           </a:xfrm>
           <a:prstGeom prst="rect">
             <a:avLst/>
           </a:prstGeom>
           <a:noFill/>
-        </p:spPr>
-        <p:txBody>
-          <a:bodyPr wrap="square" rtlCol="0">
-            <a:spAutoFit/>
-          </a:bodyPr>
-          <a:lstStyle/>
-          <a:p>
-            <a:r>
-              <a:rPr lang="en-US" altLang="ja-JP" sz="1400" dirty="0" smtClean="0"/>
-              <a:t>Private key</a:t>
-            </a:r>
-            <a:endParaRPr kumimoji="1" lang="ja-JP" altLang="en-US" sz="1400" dirty="0"/>
-          </a:p>
-        </p:txBody>
-      </p:sp>
-      <p:sp>
-        <p:nvSpPr>
-          <p:cNvPr id="6" name="フローチャート : 書類 5"/>
-          <p:cNvSpPr/>
-          <p:nvPr/>
-        </p:nvSpPr>
-        <p:spPr>
-          <a:xfrm>
-            <a:off x="544125" y="3033092"/>
-            <a:ext cx="936104" cy="547446"/>
-          </a:xfrm>
-          <a:prstGeom prst="flowChartDocument">
-            <a:avLst/>
-          </a:prstGeom>
-          <a:noFill/>
+          <a:ln w="3175" cmpd="sng">
+            <a:prstDash val="dash"/>
+          </a:ln>
         </p:spPr>
         <p:style>
           <a:lnRef idx="2">
-            <a:schemeClr val="accent1">
-              <a:shade val="50000"/>
-            </a:schemeClr>
+            <a:schemeClr val="dk1"/>
           </a:lnRef>
           <a:fillRef idx="1">
-            <a:schemeClr val="accent1"/>
+            <a:schemeClr val="lt1"/>
           </a:fillRef>
           <a:effectRef idx="0">
-            <a:schemeClr val="accent1"/>
+            <a:schemeClr val="dk1"/>
           </a:effectRef>
           <a:fontRef idx="minor">
-            <a:schemeClr val="lt1"/>
+            <a:schemeClr val="dk1"/>
           </a:fontRef>
         </p:style>
         <p:txBody>
@@ -7154,992 +6040,29 @@
           <a:lstStyle/>
           <a:p>
             <a:pPr algn="ctr"/>
-            <a:r>
-              <a:rPr kumimoji="1" lang="en-US" altLang="ja-JP" sz="1400" dirty="0" smtClean="0">
-                <a:solidFill>
-                  <a:schemeClr val="tx1"/>
-                </a:solidFill>
-              </a:rPr>
-              <a:t>plaintext</a:t>
-            </a:r>
-            <a:endParaRPr kumimoji="1" lang="ja-JP" altLang="en-US" sz="1400" dirty="0">
-              <a:solidFill>
-                <a:schemeClr val="tx1"/>
-              </a:solidFill>
-            </a:endParaRPr>
-          </a:p>
-        </p:txBody>
-      </p:sp>
-      <p:sp>
-        <p:nvSpPr>
-          <p:cNvPr id="7" name="フローチャート : 書類 6"/>
+            <a:endParaRPr kumimoji="1" lang="ja-JP" altLang="en-US"/>
+          </a:p>
+        </p:txBody>
+      </p:sp>
+      <p:sp>
+        <p:nvSpPr>
+          <p:cNvPr id="86" name="U ターン矢印 85"/>
           <p:cNvSpPr/>
           <p:nvPr/>
         </p:nvSpPr>
         <p:spPr>
-          <a:xfrm>
-            <a:off x="2627784" y="3025570"/>
-            <a:ext cx="936104" cy="547446"/>
-          </a:xfrm>
-          <a:prstGeom prst="flowChartDocument">
-            <a:avLst/>
-          </a:prstGeom>
-        </p:spPr>
-        <p:style>
-          <a:lnRef idx="2">
-            <a:schemeClr val="accent1">
-              <a:shade val="50000"/>
-            </a:schemeClr>
-          </a:lnRef>
-          <a:fillRef idx="1">
-            <a:schemeClr val="accent1"/>
-          </a:fillRef>
-          <a:effectRef idx="0">
-            <a:schemeClr val="accent1"/>
-          </a:effectRef>
-          <a:fontRef idx="minor">
-            <a:schemeClr val="lt1"/>
-          </a:fontRef>
-        </p:style>
-        <p:txBody>
-          <a:bodyPr rtlCol="0" anchor="ctr"/>
-          <a:lstStyle/>
-          <a:p>
-            <a:pPr algn="ctr"/>
-            <a:r>
-              <a:rPr lang="en-US" altLang="ja-JP" sz="1400" dirty="0" err="1" smtClean="0"/>
-              <a:t>ciphertext</a:t>
-            </a:r>
-            <a:endParaRPr kumimoji="1" lang="ja-JP" altLang="en-US" sz="1400" dirty="0"/>
-          </a:p>
-        </p:txBody>
-      </p:sp>
-      <p:sp>
-        <p:nvSpPr>
-          <p:cNvPr id="2" name="円/楕円 1"/>
-          <p:cNvSpPr/>
-          <p:nvPr/>
-        </p:nvSpPr>
-        <p:spPr>
-          <a:xfrm>
-            <a:off x="4124193" y="820995"/>
-            <a:ext cx="720080" cy="3544109"/>
-          </a:xfrm>
-          <a:prstGeom prst="ellipse">
-            <a:avLst/>
-          </a:prstGeom>
-          <a:noFill/>
-        </p:spPr>
-        <p:style>
-          <a:lnRef idx="2">
-            <a:schemeClr val="accent1">
-              <a:shade val="50000"/>
-            </a:schemeClr>
-          </a:lnRef>
-          <a:fillRef idx="1">
-            <a:schemeClr val="accent1"/>
-          </a:fillRef>
-          <a:effectRef idx="0">
-            <a:schemeClr val="accent1"/>
-          </a:effectRef>
-          <a:fontRef idx="minor">
-            <a:schemeClr val="lt1"/>
-          </a:fontRef>
-        </p:style>
-        <p:txBody>
-          <a:bodyPr rtlCol="0" anchor="ctr"/>
-          <a:lstStyle/>
-          <a:p>
-            <a:pPr algn="ctr"/>
-            <a:endParaRPr kumimoji="1" lang="ja-JP" altLang="en-US" dirty="0">
-              <a:solidFill>
-                <a:schemeClr val="tx1"/>
-              </a:solidFill>
-            </a:endParaRPr>
-          </a:p>
-        </p:txBody>
-      </p:sp>
-      <p:cxnSp>
-        <p:nvCxnSpPr>
-          <p:cNvPr id="8" name="直線コネクタ 7"/>
-          <p:cNvCxnSpPr>
-            <a:stCxn id="2" idx="1"/>
-            <a:endCxn id="2" idx="5"/>
-          </p:cNvCxnSpPr>
-          <p:nvPr/>
-        </p:nvCxnSpPr>
-        <p:spPr>
-          <a:xfrm>
-            <a:off x="4229646" y="1340018"/>
-            <a:ext cx="509174" cy="2506063"/>
-          </a:xfrm>
-          <a:prstGeom prst="line">
-            <a:avLst/>
-          </a:prstGeom>
-        </p:spPr>
-        <p:style>
-          <a:lnRef idx="1">
-            <a:schemeClr val="accent1"/>
-          </a:lnRef>
-          <a:fillRef idx="0">
-            <a:schemeClr val="accent1"/>
-          </a:fillRef>
-          <a:effectRef idx="0">
-            <a:schemeClr val="accent1"/>
-          </a:effectRef>
-          <a:fontRef idx="minor">
-            <a:schemeClr val="tx1"/>
-          </a:fontRef>
-        </p:style>
-      </p:cxnSp>
-      <p:cxnSp>
-        <p:nvCxnSpPr>
-          <p:cNvPr id="10" name="直線コネクタ 9"/>
-          <p:cNvCxnSpPr>
-            <a:stCxn id="2" idx="7"/>
-            <a:endCxn id="2" idx="3"/>
-          </p:cNvCxnSpPr>
-          <p:nvPr/>
-        </p:nvCxnSpPr>
-        <p:spPr>
-          <a:xfrm flipH="1">
-            <a:off x="4229646" y="1340018"/>
-            <a:ext cx="509174" cy="2506063"/>
-          </a:xfrm>
-          <a:prstGeom prst="line">
-            <a:avLst/>
-          </a:prstGeom>
-        </p:spPr>
-        <p:style>
-          <a:lnRef idx="1">
-            <a:schemeClr val="accent1"/>
-          </a:lnRef>
-          <a:fillRef idx="0">
-            <a:schemeClr val="accent1"/>
-          </a:fillRef>
-          <a:effectRef idx="0">
-            <a:schemeClr val="accent1"/>
-          </a:effectRef>
-          <a:fontRef idx="minor">
-            <a:schemeClr val="tx1"/>
-          </a:fontRef>
-        </p:style>
-      </p:cxnSp>
-      <p:pic>
-        <p:nvPicPr>
-          <p:cNvPr id="21" name="Picture 6" descr="C:\Users\btsatoukzn\AppData\Local\Microsoft\Windows\Temporary Internet Files\Content.IE5\OBY1ZMWA\sgi01a201411140000[1].jpg"/>
-          <p:cNvPicPr>
-            <a:picLocks noChangeAspect="1" noChangeArrowheads="1"/>
-          </p:cNvPicPr>
-          <p:nvPr/>
-        </p:nvPicPr>
-        <p:blipFill>
-          <a:blip r:embed="rId3" cstate="print">
-            <a:extLst>
-              <a:ext uri="{28A0092B-C50C-407E-A947-70E740481C1C}">
-                <a14:useLocalDpi xmlns:a14="http://schemas.microsoft.com/office/drawing/2010/main" val="0"/>
-              </a:ext>
-            </a:extLst>
-          </a:blip>
-          <a:srcRect/>
-          <a:stretch>
-            <a:fillRect/>
-          </a:stretch>
-        </p:blipFill>
-        <p:spPr bwMode="auto">
-          <a:xfrm>
-            <a:off x="1547664" y="1844824"/>
-            <a:ext cx="792088" cy="792088"/>
-          </a:xfrm>
-          <a:prstGeom prst="rect">
-            <a:avLst/>
-          </a:prstGeom>
-          <a:noFill/>
-          <a:extLst>
-            <a:ext uri="{909E8E84-426E-40DD-AFC4-6F175D3DCCD1}">
-              <a14:hiddenFill xmlns:a14="http://schemas.microsoft.com/office/drawing/2010/main">
-                <a:solidFill>
-                  <a:srgbClr val="FFFFFF"/>
-                </a:solidFill>
-              </a14:hiddenFill>
-            </a:ext>
-          </a:extLst>
-        </p:spPr>
-      </p:pic>
-      <p:sp>
-        <p:nvSpPr>
-          <p:cNvPr id="22" name="テキスト ボックス 21"/>
-          <p:cNvSpPr txBox="1"/>
-          <p:nvPr/>
-        </p:nvSpPr>
-        <p:spPr>
-          <a:xfrm>
-            <a:off x="1394611" y="2348880"/>
-            <a:ext cx="1305181" cy="307777"/>
-          </a:xfrm>
-          <a:prstGeom prst="rect">
-            <a:avLst/>
-          </a:prstGeom>
-          <a:noFill/>
-        </p:spPr>
-        <p:txBody>
-          <a:bodyPr wrap="square" rtlCol="0">
-            <a:spAutoFit/>
-          </a:bodyPr>
-          <a:lstStyle/>
-          <a:p>
-            <a:r>
-              <a:rPr lang="en-US" altLang="ja-JP" sz="1400" dirty="0" smtClean="0"/>
-              <a:t>Common key</a:t>
-            </a:r>
-            <a:endParaRPr kumimoji="1" lang="ja-JP" altLang="en-US" sz="1400" dirty="0"/>
-          </a:p>
-        </p:txBody>
-      </p:sp>
-      <p:sp>
-        <p:nvSpPr>
-          <p:cNvPr id="23" name="右矢印 22"/>
-          <p:cNvSpPr/>
-          <p:nvPr/>
-        </p:nvSpPr>
-        <p:spPr>
-          <a:xfrm>
-            <a:off x="1691680" y="3185657"/>
-            <a:ext cx="792088" cy="242316"/>
-          </a:xfrm>
-          <a:prstGeom prst="rightArrow">
-            <a:avLst/>
-          </a:prstGeom>
-        </p:spPr>
-        <p:style>
-          <a:lnRef idx="2">
-            <a:schemeClr val="accent2">
-              <a:shade val="50000"/>
-            </a:schemeClr>
-          </a:lnRef>
-          <a:fillRef idx="1">
-            <a:schemeClr val="accent2"/>
-          </a:fillRef>
-          <a:effectRef idx="0">
-            <a:schemeClr val="accent2"/>
-          </a:effectRef>
-          <a:fontRef idx="minor">
-            <a:schemeClr val="lt1"/>
-          </a:fontRef>
-        </p:style>
-        <p:txBody>
-          <a:bodyPr rtlCol="0" anchor="ctr"/>
-          <a:lstStyle/>
-          <a:p>
-            <a:pPr algn="ctr"/>
-            <a:endParaRPr kumimoji="1" lang="ja-JP" altLang="en-US"/>
-          </a:p>
-        </p:txBody>
-      </p:sp>
-      <p:pic>
-        <p:nvPicPr>
-          <p:cNvPr id="24" name="Picture 8" descr="C:\Users\btsatoukzn\AppData\Local\Microsoft\Windows\Temporary Internet Files\Content.IE5\M6M6BGPK\lgi01e201408170400[1].jpg"/>
-          <p:cNvPicPr>
-            <a:picLocks noChangeAspect="1" noChangeArrowheads="1"/>
-          </p:cNvPicPr>
-          <p:nvPr/>
-        </p:nvPicPr>
-        <p:blipFill>
-          <a:blip r:embed="rId4" cstate="print">
-            <a:extLst>
-              <a:ext uri="{28A0092B-C50C-407E-A947-70E740481C1C}">
-                <a14:useLocalDpi xmlns:a14="http://schemas.microsoft.com/office/drawing/2010/main" val="0"/>
-              </a:ext>
-            </a:extLst>
-          </a:blip>
-          <a:srcRect/>
-          <a:stretch>
-            <a:fillRect/>
-          </a:stretch>
-        </p:blipFill>
-        <p:spPr bwMode="auto">
           <a:xfrm rot="5400000">
-            <a:off x="3188064" y="1829040"/>
-            <a:ext cx="368013" cy="815683"/>
-          </a:xfrm>
-          <a:prstGeom prst="rect">
-            <a:avLst/>
-          </a:prstGeom>
-          <a:noFill/>
-          <a:extLst>
-            <a:ext uri="{909E8E84-426E-40DD-AFC4-6F175D3DCCD1}">
-              <a14:hiddenFill xmlns:a14="http://schemas.microsoft.com/office/drawing/2010/main">
-                <a:solidFill>
-                  <a:srgbClr val="FFFFFF"/>
-                </a:solidFill>
-              </a14:hiddenFill>
-            </a:ext>
-          </a:extLst>
-        </p:spPr>
-      </p:pic>
-      <p:sp>
-        <p:nvSpPr>
-          <p:cNvPr id="25" name="テキスト ボックス 24"/>
-          <p:cNvSpPr txBox="1"/>
-          <p:nvPr/>
-        </p:nvSpPr>
-        <p:spPr>
-          <a:xfrm>
-            <a:off x="2756589" y="2401143"/>
-            <a:ext cx="1383363" cy="307777"/>
-          </a:xfrm>
-          <a:prstGeom prst="rect">
-            <a:avLst/>
-          </a:prstGeom>
-          <a:noFill/>
-        </p:spPr>
-        <p:txBody>
-          <a:bodyPr wrap="square" rtlCol="0">
-            <a:spAutoFit/>
-          </a:bodyPr>
-          <a:lstStyle/>
-          <a:p>
-            <a:r>
-              <a:rPr lang="en-US" altLang="ja-JP" sz="1400" dirty="0" smtClean="0"/>
-              <a:t>Encrypted key</a:t>
-            </a:r>
-            <a:endParaRPr kumimoji="1" lang="ja-JP" altLang="en-US" sz="1400" dirty="0"/>
-          </a:p>
-        </p:txBody>
-      </p:sp>
-      <p:sp>
-        <p:nvSpPr>
-          <p:cNvPr id="26" name="右矢印 25"/>
-          <p:cNvSpPr/>
-          <p:nvPr/>
-        </p:nvSpPr>
-        <p:spPr>
-          <a:xfrm>
-            <a:off x="2483768" y="2119846"/>
-            <a:ext cx="380833" cy="229034"/>
-          </a:xfrm>
-          <a:prstGeom prst="rightArrow">
-            <a:avLst/>
-          </a:prstGeom>
-        </p:spPr>
-        <p:style>
-          <a:lnRef idx="2">
-            <a:schemeClr val="accent2">
-              <a:shade val="50000"/>
-            </a:schemeClr>
-          </a:lnRef>
-          <a:fillRef idx="1">
-            <a:schemeClr val="accent2"/>
-          </a:fillRef>
-          <a:effectRef idx="0">
-            <a:schemeClr val="accent2"/>
-          </a:effectRef>
-          <a:fontRef idx="minor">
-            <a:schemeClr val="lt1"/>
-          </a:fontRef>
-        </p:style>
-        <p:txBody>
-          <a:bodyPr rtlCol="0" anchor="ctr"/>
-          <a:lstStyle/>
-          <a:p>
-            <a:pPr algn="ctr"/>
-            <a:endParaRPr kumimoji="1" lang="ja-JP" altLang="en-US"/>
-          </a:p>
-        </p:txBody>
-      </p:sp>
-      <p:pic>
-        <p:nvPicPr>
-          <p:cNvPr id="27" name="Picture 4" descr="C:\Users\btsatoukzn\AppData\Local\Microsoft\Windows\Temporary Internet Files\Content.IE5\M6M6BGPK\lgi01b201408170400[1].jpg"/>
-          <p:cNvPicPr>
-            <a:picLocks noChangeAspect="1" noChangeArrowheads="1"/>
-          </p:cNvPicPr>
-          <p:nvPr/>
-        </p:nvPicPr>
-        <p:blipFill>
-          <a:blip r:embed="rId5" cstate="print">
-            <a:extLst>
-              <a:ext uri="{28A0092B-C50C-407E-A947-70E740481C1C}">
-                <a14:useLocalDpi xmlns:a14="http://schemas.microsoft.com/office/drawing/2010/main" val="0"/>
-              </a:ext>
-            </a:extLst>
-          </a:blip>
-          <a:srcRect/>
-          <a:stretch>
-            <a:fillRect/>
-          </a:stretch>
-        </p:blipFill>
-        <p:spPr bwMode="auto">
-          <a:xfrm rot="5400000">
-            <a:off x="2513613" y="732402"/>
-            <a:ext cx="372358" cy="1089412"/>
-          </a:xfrm>
-          <a:prstGeom prst="rect">
-            <a:avLst/>
-          </a:prstGeom>
-          <a:noFill/>
-          <a:extLst>
-            <a:ext uri="{909E8E84-426E-40DD-AFC4-6F175D3DCCD1}">
-              <a14:hiddenFill xmlns:a14="http://schemas.microsoft.com/office/drawing/2010/main">
-                <a:solidFill>
-                  <a:srgbClr val="FFFFFF"/>
-                </a:solidFill>
-              </a14:hiddenFill>
-            </a:ext>
-          </a:extLst>
-        </p:spPr>
-      </p:pic>
-      <p:sp>
-        <p:nvSpPr>
-          <p:cNvPr id="28" name="テキスト ボックス 27"/>
-          <p:cNvSpPr txBox="1"/>
-          <p:nvPr/>
-        </p:nvSpPr>
-        <p:spPr>
-          <a:xfrm>
-            <a:off x="2267744" y="1465039"/>
-            <a:ext cx="1338307" cy="307777"/>
-          </a:xfrm>
-          <a:prstGeom prst="rect">
-            <a:avLst/>
-          </a:prstGeom>
-          <a:noFill/>
-        </p:spPr>
-        <p:txBody>
-          <a:bodyPr wrap="square" rtlCol="0">
-            <a:spAutoFit/>
-          </a:bodyPr>
-          <a:lstStyle/>
-          <a:p>
-            <a:r>
-              <a:rPr lang="en-US" altLang="ja-JP" sz="1400" dirty="0" smtClean="0"/>
-              <a:t>Public key</a:t>
-            </a:r>
-            <a:endParaRPr kumimoji="1" lang="ja-JP" altLang="en-US" sz="1400" dirty="0"/>
-          </a:p>
-        </p:txBody>
-      </p:sp>
-      <p:sp>
-        <p:nvSpPr>
-          <p:cNvPr id="29" name="下矢印 28"/>
-          <p:cNvSpPr/>
-          <p:nvPr/>
-        </p:nvSpPr>
-        <p:spPr>
-          <a:xfrm>
-            <a:off x="1943708" y="2708920"/>
-            <a:ext cx="180020" cy="432048"/>
-          </a:xfrm>
-          <a:prstGeom prst="downArrow">
-            <a:avLst/>
-          </a:prstGeom>
-        </p:spPr>
-        <p:style>
-          <a:lnRef idx="2">
-            <a:schemeClr val="accent2">
-              <a:shade val="50000"/>
-            </a:schemeClr>
-          </a:lnRef>
-          <a:fillRef idx="1">
-            <a:schemeClr val="accent2"/>
-          </a:fillRef>
-          <a:effectRef idx="0">
-            <a:schemeClr val="accent2"/>
-          </a:effectRef>
-          <a:fontRef idx="minor">
-            <a:schemeClr val="lt1"/>
-          </a:fontRef>
-        </p:style>
-        <p:txBody>
-          <a:bodyPr rtlCol="0" anchor="ctr"/>
-          <a:lstStyle/>
-          <a:p>
-            <a:pPr algn="ctr"/>
-            <a:endParaRPr kumimoji="1" lang="ja-JP" altLang="en-US"/>
-          </a:p>
-        </p:txBody>
-      </p:sp>
-      <p:sp>
-        <p:nvSpPr>
-          <p:cNvPr id="30" name="下矢印 29"/>
-          <p:cNvSpPr/>
-          <p:nvPr/>
-        </p:nvSpPr>
-        <p:spPr>
-          <a:xfrm>
-            <a:off x="2609782" y="1763581"/>
-            <a:ext cx="90010" cy="289294"/>
-          </a:xfrm>
-          <a:prstGeom prst="downArrow">
-            <a:avLst/>
-          </a:prstGeom>
-        </p:spPr>
-        <p:style>
-          <a:lnRef idx="2">
-            <a:schemeClr val="accent2">
-              <a:shade val="50000"/>
-            </a:schemeClr>
-          </a:lnRef>
-          <a:fillRef idx="1">
-            <a:schemeClr val="accent2"/>
-          </a:fillRef>
-          <a:effectRef idx="0">
-            <a:schemeClr val="accent2"/>
-          </a:effectRef>
-          <a:fontRef idx="minor">
-            <a:schemeClr val="lt1"/>
-          </a:fontRef>
-        </p:style>
-        <p:txBody>
-          <a:bodyPr rtlCol="0" anchor="ctr"/>
-          <a:lstStyle/>
-          <a:p>
-            <a:pPr algn="ctr"/>
-            <a:endParaRPr kumimoji="1" lang="ja-JP" altLang="en-US"/>
-          </a:p>
-        </p:txBody>
-      </p:sp>
-      <p:sp>
-        <p:nvSpPr>
-          <p:cNvPr id="31" name="テキスト ボックス 30"/>
-          <p:cNvSpPr txBox="1"/>
-          <p:nvPr/>
-        </p:nvSpPr>
-        <p:spPr>
-          <a:xfrm>
-            <a:off x="4124193" y="2473151"/>
-            <a:ext cx="951863" cy="307777"/>
-          </a:xfrm>
-          <a:prstGeom prst="rect">
-            <a:avLst/>
-          </a:prstGeom>
-          <a:noFill/>
-        </p:spPr>
-        <p:txBody>
-          <a:bodyPr wrap="square" rtlCol="0">
-            <a:spAutoFit/>
-          </a:bodyPr>
-          <a:lstStyle/>
-          <a:p>
-            <a:r>
-              <a:rPr kumimoji="1" lang="en-US" altLang="ja-JP" sz="1400" dirty="0" smtClean="0"/>
-              <a:t>network</a:t>
-            </a:r>
-            <a:endParaRPr kumimoji="1" lang="ja-JP" altLang="en-US" sz="1400" dirty="0"/>
-          </a:p>
-        </p:txBody>
-      </p:sp>
-      <p:pic>
-        <p:nvPicPr>
-          <p:cNvPr id="32" name="Picture 8" descr="C:\Users\btsatoukzn\AppData\Local\Microsoft\Windows\Temporary Internet Files\Content.IE5\M6M6BGPK\lgi01e201408170400[1].jpg"/>
-          <p:cNvPicPr>
-            <a:picLocks noChangeAspect="1" noChangeArrowheads="1"/>
-          </p:cNvPicPr>
-          <p:nvPr/>
-        </p:nvPicPr>
-        <p:blipFill>
-          <a:blip r:embed="rId4" cstate="print">
-            <a:extLst>
-              <a:ext uri="{28A0092B-C50C-407E-A947-70E740481C1C}">
-                <a14:useLocalDpi xmlns:a14="http://schemas.microsoft.com/office/drawing/2010/main" val="0"/>
-              </a:ext>
-            </a:extLst>
-          </a:blip>
-          <a:srcRect/>
-          <a:stretch>
-            <a:fillRect/>
-          </a:stretch>
-        </p:blipFill>
-        <p:spPr bwMode="auto">
-          <a:xfrm rot="5400000">
-            <a:off x="5363515" y="1829040"/>
-            <a:ext cx="368013" cy="815683"/>
-          </a:xfrm>
-          <a:prstGeom prst="rect">
-            <a:avLst/>
-          </a:prstGeom>
-          <a:noFill/>
-          <a:extLst>
-            <a:ext uri="{909E8E84-426E-40DD-AFC4-6F175D3DCCD1}">
-              <a14:hiddenFill xmlns:a14="http://schemas.microsoft.com/office/drawing/2010/main">
-                <a:solidFill>
-                  <a:srgbClr val="FFFFFF"/>
-                </a:solidFill>
-              </a14:hiddenFill>
-            </a:ext>
-          </a:extLst>
-        </p:spPr>
-      </p:pic>
-      <p:sp>
-        <p:nvSpPr>
-          <p:cNvPr id="33" name="テキスト ボックス 32"/>
-          <p:cNvSpPr txBox="1"/>
-          <p:nvPr/>
-        </p:nvSpPr>
-        <p:spPr>
-          <a:xfrm>
-            <a:off x="4932040" y="2401143"/>
-            <a:ext cx="1383363" cy="307777"/>
-          </a:xfrm>
-          <a:prstGeom prst="rect">
-            <a:avLst/>
-          </a:prstGeom>
-          <a:noFill/>
-        </p:spPr>
-        <p:txBody>
-          <a:bodyPr wrap="square" rtlCol="0">
-            <a:spAutoFit/>
-          </a:bodyPr>
-          <a:lstStyle/>
-          <a:p>
-            <a:r>
-              <a:rPr lang="en-US" altLang="ja-JP" sz="1400" dirty="0" smtClean="0"/>
-              <a:t>Encrypted key</a:t>
-            </a:r>
-            <a:endParaRPr kumimoji="1" lang="ja-JP" altLang="en-US" sz="1400" dirty="0"/>
-          </a:p>
-        </p:txBody>
-      </p:sp>
-      <p:pic>
-        <p:nvPicPr>
-          <p:cNvPr id="34" name="Picture 6" descr="C:\Users\btsatoukzn\AppData\Local\Microsoft\Windows\Temporary Internet Files\Content.IE5\OBY1ZMWA\sgi01a201411140000[1].jpg"/>
-          <p:cNvPicPr>
-            <a:picLocks noChangeAspect="1" noChangeArrowheads="1"/>
-          </p:cNvPicPr>
-          <p:nvPr/>
-        </p:nvPicPr>
-        <p:blipFill>
-          <a:blip r:embed="rId3" cstate="print">
-            <a:extLst>
-              <a:ext uri="{28A0092B-C50C-407E-A947-70E740481C1C}">
-                <a14:useLocalDpi xmlns:a14="http://schemas.microsoft.com/office/drawing/2010/main" val="0"/>
-              </a:ext>
-            </a:extLst>
-          </a:blip>
-          <a:srcRect/>
-          <a:stretch>
-            <a:fillRect/>
-          </a:stretch>
-        </p:blipFill>
-        <p:spPr bwMode="auto">
-          <a:xfrm>
-            <a:off x="6540464" y="1825079"/>
-            <a:ext cx="792088" cy="792088"/>
-          </a:xfrm>
-          <a:prstGeom prst="rect">
-            <a:avLst/>
-          </a:prstGeom>
-          <a:noFill/>
-          <a:extLst>
-            <a:ext uri="{909E8E84-426E-40DD-AFC4-6F175D3DCCD1}">
-              <a14:hiddenFill xmlns:a14="http://schemas.microsoft.com/office/drawing/2010/main">
-                <a:solidFill>
-                  <a:srgbClr val="FFFFFF"/>
-                </a:solidFill>
-              </a14:hiddenFill>
-            </a:ext>
-          </a:extLst>
-        </p:spPr>
-      </p:pic>
-      <p:sp>
-        <p:nvSpPr>
-          <p:cNvPr id="35" name="テキスト ボックス 34"/>
-          <p:cNvSpPr txBox="1"/>
-          <p:nvPr/>
-        </p:nvSpPr>
-        <p:spPr>
-          <a:xfrm>
-            <a:off x="6387411" y="2329135"/>
-            <a:ext cx="1305181" cy="307777"/>
-          </a:xfrm>
-          <a:prstGeom prst="rect">
-            <a:avLst/>
-          </a:prstGeom>
-          <a:noFill/>
-        </p:spPr>
-        <p:txBody>
-          <a:bodyPr wrap="square" rtlCol="0">
-            <a:spAutoFit/>
-          </a:bodyPr>
-          <a:lstStyle/>
-          <a:p>
-            <a:r>
-              <a:rPr lang="en-US" altLang="ja-JP" sz="1400" dirty="0" smtClean="0"/>
-              <a:t>Common key</a:t>
-            </a:r>
-            <a:endParaRPr kumimoji="1" lang="ja-JP" altLang="en-US" sz="1400" dirty="0"/>
-          </a:p>
-        </p:txBody>
-      </p:sp>
-      <p:sp>
-        <p:nvSpPr>
-          <p:cNvPr id="37" name="下矢印 36"/>
-          <p:cNvSpPr/>
-          <p:nvPr/>
-        </p:nvSpPr>
-        <p:spPr>
-          <a:xfrm>
-            <a:off x="6243395" y="1741689"/>
-            <a:ext cx="90010" cy="289294"/>
-          </a:xfrm>
-          <a:prstGeom prst="downArrow">
-            <a:avLst/>
-          </a:prstGeom>
-        </p:spPr>
-        <p:style>
-          <a:lnRef idx="2">
-            <a:schemeClr val="accent1">
-              <a:shade val="50000"/>
-            </a:schemeClr>
-          </a:lnRef>
-          <a:fillRef idx="1">
-            <a:schemeClr val="accent1"/>
-          </a:fillRef>
-          <a:effectRef idx="0">
-            <a:schemeClr val="accent1"/>
-          </a:effectRef>
-          <a:fontRef idx="minor">
-            <a:schemeClr val="lt1"/>
-          </a:fontRef>
-        </p:style>
-        <p:txBody>
-          <a:bodyPr rtlCol="0" anchor="ctr"/>
-          <a:lstStyle/>
-          <a:p>
-            <a:pPr algn="ctr"/>
-            <a:endParaRPr kumimoji="1" lang="ja-JP" altLang="en-US"/>
-          </a:p>
-        </p:txBody>
-      </p:sp>
-      <p:sp>
-        <p:nvSpPr>
-          <p:cNvPr id="38" name="フローチャート : 書類 37"/>
-          <p:cNvSpPr/>
-          <p:nvPr/>
-        </p:nvSpPr>
-        <p:spPr>
-          <a:xfrm>
-            <a:off x="5436096" y="2996952"/>
-            <a:ext cx="936104" cy="547446"/>
-          </a:xfrm>
-          <a:prstGeom prst="flowChartDocument">
-            <a:avLst/>
-          </a:prstGeom>
-        </p:spPr>
-        <p:style>
-          <a:lnRef idx="2">
-            <a:schemeClr val="accent1">
-              <a:shade val="50000"/>
-            </a:schemeClr>
-          </a:lnRef>
-          <a:fillRef idx="1">
-            <a:schemeClr val="accent1"/>
-          </a:fillRef>
-          <a:effectRef idx="0">
-            <a:schemeClr val="accent1"/>
-          </a:effectRef>
-          <a:fontRef idx="minor">
-            <a:schemeClr val="lt1"/>
-          </a:fontRef>
-        </p:style>
-        <p:txBody>
-          <a:bodyPr rtlCol="0" anchor="ctr"/>
-          <a:lstStyle/>
-          <a:p>
-            <a:pPr algn="ctr"/>
-            <a:r>
-              <a:rPr lang="en-US" altLang="ja-JP" sz="1400" dirty="0" err="1" smtClean="0"/>
-              <a:t>ciphertext</a:t>
-            </a:r>
-            <a:endParaRPr kumimoji="1" lang="ja-JP" altLang="en-US" sz="1400" dirty="0"/>
-          </a:p>
-        </p:txBody>
-      </p:sp>
-      <p:sp>
-        <p:nvSpPr>
-          <p:cNvPr id="39" name="フローチャート : 書類 38"/>
-          <p:cNvSpPr/>
-          <p:nvPr/>
-        </p:nvSpPr>
-        <p:spPr>
-          <a:xfrm>
-            <a:off x="7380312" y="2996952"/>
-            <a:ext cx="936104" cy="547446"/>
-          </a:xfrm>
-          <a:prstGeom prst="flowChartDocument">
-            <a:avLst/>
-          </a:prstGeom>
-          <a:noFill/>
-        </p:spPr>
-        <p:style>
-          <a:lnRef idx="2">
-            <a:schemeClr val="accent1">
-              <a:shade val="50000"/>
-            </a:schemeClr>
-          </a:lnRef>
-          <a:fillRef idx="1">
-            <a:schemeClr val="accent1"/>
-          </a:fillRef>
-          <a:effectRef idx="0">
-            <a:schemeClr val="accent1"/>
-          </a:effectRef>
-          <a:fontRef idx="minor">
-            <a:schemeClr val="lt1"/>
-          </a:fontRef>
-        </p:style>
-        <p:txBody>
-          <a:bodyPr rtlCol="0" anchor="ctr"/>
-          <a:lstStyle/>
-          <a:p>
-            <a:pPr algn="ctr"/>
-            <a:r>
-              <a:rPr kumimoji="1" lang="en-US" altLang="ja-JP" sz="1400" dirty="0" smtClean="0">
-                <a:solidFill>
-                  <a:schemeClr val="tx1"/>
-                </a:solidFill>
-              </a:rPr>
-              <a:t>plaintext</a:t>
-            </a:r>
-            <a:endParaRPr kumimoji="1" lang="ja-JP" altLang="en-US" sz="1400" dirty="0">
-              <a:solidFill>
-                <a:schemeClr val="tx1"/>
-              </a:solidFill>
-            </a:endParaRPr>
-          </a:p>
-        </p:txBody>
-      </p:sp>
-      <p:sp>
-        <p:nvSpPr>
-          <p:cNvPr id="40" name="右矢印 39"/>
-          <p:cNvSpPr/>
-          <p:nvPr/>
-        </p:nvSpPr>
-        <p:spPr>
-          <a:xfrm>
-            <a:off x="6056838" y="2106606"/>
-            <a:ext cx="380833" cy="229034"/>
-          </a:xfrm>
-          <a:prstGeom prst="rightArrow">
-            <a:avLst/>
-          </a:prstGeom>
-        </p:spPr>
-        <p:style>
-          <a:lnRef idx="2">
-            <a:schemeClr val="accent1">
-              <a:shade val="50000"/>
-            </a:schemeClr>
-          </a:lnRef>
-          <a:fillRef idx="1">
-            <a:schemeClr val="accent1"/>
-          </a:fillRef>
-          <a:effectRef idx="0">
-            <a:schemeClr val="accent1"/>
-          </a:effectRef>
-          <a:fontRef idx="minor">
-            <a:schemeClr val="lt1"/>
-          </a:fontRef>
-        </p:style>
-        <p:txBody>
-          <a:bodyPr rtlCol="0" anchor="ctr"/>
-          <a:lstStyle/>
-          <a:p>
-            <a:pPr algn="ctr"/>
-            <a:endParaRPr kumimoji="1" lang="ja-JP" altLang="en-US"/>
-          </a:p>
-        </p:txBody>
-      </p:sp>
-      <p:sp>
-        <p:nvSpPr>
-          <p:cNvPr id="41" name="右矢印 40"/>
-          <p:cNvSpPr/>
-          <p:nvPr/>
-        </p:nvSpPr>
-        <p:spPr>
-          <a:xfrm>
-            <a:off x="6473711" y="3094879"/>
-            <a:ext cx="792088" cy="242316"/>
-          </a:xfrm>
-          <a:prstGeom prst="rightArrow">
-            <a:avLst/>
-          </a:prstGeom>
-        </p:spPr>
-        <p:style>
-          <a:lnRef idx="2">
-            <a:schemeClr val="accent1">
-              <a:shade val="50000"/>
-            </a:schemeClr>
-          </a:lnRef>
-          <a:fillRef idx="1">
-            <a:schemeClr val="accent1"/>
-          </a:fillRef>
-          <a:effectRef idx="0">
-            <a:schemeClr val="accent1"/>
-          </a:effectRef>
-          <a:fontRef idx="minor">
-            <a:schemeClr val="lt1"/>
-          </a:fontRef>
-        </p:style>
-        <p:txBody>
-          <a:bodyPr rtlCol="0" anchor="ctr"/>
-          <a:lstStyle/>
-          <a:p>
-            <a:pPr algn="ctr"/>
-            <a:endParaRPr kumimoji="1" lang="ja-JP" altLang="en-US"/>
-          </a:p>
-        </p:txBody>
-      </p:sp>
-      <p:sp>
-        <p:nvSpPr>
-          <p:cNvPr id="42" name="下矢印 41"/>
-          <p:cNvSpPr/>
-          <p:nvPr/>
-        </p:nvSpPr>
-        <p:spPr>
-          <a:xfrm>
-            <a:off x="6908966" y="2605933"/>
-            <a:ext cx="180020" cy="432048"/>
-          </a:xfrm>
-          <a:prstGeom prst="downArrow">
-            <a:avLst/>
-          </a:prstGeom>
-        </p:spPr>
-        <p:style>
-          <a:lnRef idx="2">
-            <a:schemeClr val="accent1">
-              <a:shade val="50000"/>
-            </a:schemeClr>
-          </a:lnRef>
-          <a:fillRef idx="1">
-            <a:schemeClr val="accent1"/>
-          </a:fillRef>
-          <a:effectRef idx="0">
-            <a:schemeClr val="accent1"/>
-          </a:effectRef>
-          <a:fontRef idx="minor">
-            <a:schemeClr val="lt1"/>
-          </a:fontRef>
-        </p:style>
-        <p:txBody>
-          <a:bodyPr rtlCol="0" anchor="ctr"/>
-          <a:lstStyle/>
-          <a:p>
-            <a:pPr algn="ctr"/>
-            <a:endParaRPr kumimoji="1" lang="ja-JP" altLang="en-US"/>
-          </a:p>
-        </p:txBody>
-      </p:sp>
-      <p:sp>
-        <p:nvSpPr>
-          <p:cNvPr id="43" name="右矢印 42"/>
-          <p:cNvSpPr/>
-          <p:nvPr/>
-        </p:nvSpPr>
-        <p:spPr>
-          <a:xfrm>
-            <a:off x="3949535" y="2149590"/>
-            <a:ext cx="1070272" cy="229034"/>
-          </a:xfrm>
-          <a:prstGeom prst="rightArrow">
-            <a:avLst/>
+            <a:off x="3993650" y="1740450"/>
+            <a:ext cx="436620" cy="2016224"/>
+          </a:xfrm>
+          <a:prstGeom prst="uturnArrow">
+            <a:avLst>
+              <a:gd name="adj1" fmla="val 25000"/>
+              <a:gd name="adj2" fmla="val 25000"/>
+              <a:gd name="adj3" fmla="val 25000"/>
+              <a:gd name="adj4" fmla="val 43750"/>
+              <a:gd name="adj5" fmla="val 100000"/>
+            </a:avLst>
           </a:prstGeom>
         </p:spPr>
         <p:style>
@@ -8163,234 +6086,18 @@
           <a:lstStyle/>
           <a:p>
             <a:pPr algn="ctr"/>
-            <a:endParaRPr kumimoji="1" lang="ja-JP" altLang="en-US"/>
-          </a:p>
-        </p:txBody>
-      </p:sp>
-      <p:sp>
-        <p:nvSpPr>
-          <p:cNvPr id="44" name="右矢印 43"/>
-          <p:cNvSpPr/>
-          <p:nvPr/>
-        </p:nvSpPr>
-        <p:spPr>
-          <a:xfrm>
-            <a:off x="3949535" y="3140968"/>
-            <a:ext cx="1129476" cy="229034"/>
-          </a:xfrm>
-          <a:prstGeom prst="rightArrow">
-            <a:avLst/>
-          </a:prstGeom>
-        </p:spPr>
-        <p:style>
-          <a:lnRef idx="2">
-            <a:schemeClr val="accent3">
-              <a:shade val="50000"/>
-            </a:schemeClr>
-          </a:lnRef>
-          <a:fillRef idx="1">
-            <a:schemeClr val="accent3"/>
-          </a:fillRef>
-          <a:effectRef idx="0">
-            <a:schemeClr val="accent3"/>
-          </a:effectRef>
-          <a:fontRef idx="minor">
-            <a:schemeClr val="lt1"/>
-          </a:fontRef>
-        </p:style>
-        <p:txBody>
-          <a:bodyPr rtlCol="0" anchor="ctr"/>
-          <a:lstStyle/>
-          <a:p>
-            <a:pPr algn="ctr"/>
-            <a:endParaRPr kumimoji="1" lang="ja-JP" altLang="en-US"/>
-          </a:p>
-        </p:txBody>
-      </p:sp>
-      <p:sp>
-        <p:nvSpPr>
-          <p:cNvPr id="45" name="テキスト ボックス 44"/>
-          <p:cNvSpPr txBox="1"/>
-          <p:nvPr/>
-        </p:nvSpPr>
-        <p:spPr>
-          <a:xfrm>
-            <a:off x="1108498" y="1979548"/>
-            <a:ext cx="871214" cy="369332"/>
-          </a:xfrm>
-          <a:prstGeom prst="rect">
-            <a:avLst/>
-          </a:prstGeom>
-          <a:noFill/>
-        </p:spPr>
-        <p:txBody>
-          <a:bodyPr wrap="square" rtlCol="0">
-            <a:spAutoFit/>
-          </a:bodyPr>
-          <a:lstStyle/>
-          <a:p>
-            <a:r>
-              <a:rPr kumimoji="1" lang="ja-JP" altLang="en-US" dirty="0" smtClean="0"/>
-              <a:t>①</a:t>
-            </a:r>
-            <a:endParaRPr kumimoji="1" lang="ja-JP" altLang="en-US" dirty="0"/>
-          </a:p>
-        </p:txBody>
-      </p:sp>
-      <p:sp>
-        <p:nvSpPr>
-          <p:cNvPr id="46" name="テキスト ボックス 45"/>
-          <p:cNvSpPr txBox="1"/>
-          <p:nvPr/>
-        </p:nvSpPr>
-        <p:spPr>
-          <a:xfrm>
-            <a:off x="1688121" y="3580538"/>
-            <a:ext cx="871214" cy="369332"/>
-          </a:xfrm>
-          <a:prstGeom prst="rect">
-            <a:avLst/>
-          </a:prstGeom>
-          <a:noFill/>
-        </p:spPr>
-        <p:txBody>
-          <a:bodyPr wrap="square" rtlCol="0">
-            <a:spAutoFit/>
-          </a:bodyPr>
-          <a:lstStyle/>
-          <a:p>
-            <a:r>
-              <a:rPr lang="ja-JP" altLang="en-US" dirty="0"/>
-              <a:t>②</a:t>
-            </a:r>
-            <a:endParaRPr kumimoji="1" lang="ja-JP" altLang="en-US" dirty="0"/>
-          </a:p>
-        </p:txBody>
-      </p:sp>
-      <p:sp>
-        <p:nvSpPr>
-          <p:cNvPr id="47" name="テキスト ボックス 46"/>
-          <p:cNvSpPr txBox="1"/>
-          <p:nvPr/>
-        </p:nvSpPr>
-        <p:spPr>
-          <a:xfrm>
-            <a:off x="2915816" y="1763524"/>
-            <a:ext cx="871214" cy="369332"/>
-          </a:xfrm>
-          <a:prstGeom prst="rect">
-            <a:avLst/>
-          </a:prstGeom>
-          <a:noFill/>
-        </p:spPr>
-        <p:txBody>
-          <a:bodyPr wrap="square" rtlCol="0">
-            <a:spAutoFit/>
-          </a:bodyPr>
-          <a:lstStyle/>
-          <a:p>
-            <a:r>
-              <a:rPr lang="ja-JP" altLang="en-US" dirty="0" smtClean="0"/>
-              <a:t>③</a:t>
-            </a:r>
-            <a:endParaRPr kumimoji="1" lang="ja-JP" altLang="en-US" dirty="0"/>
-          </a:p>
-        </p:txBody>
-      </p:sp>
-      <p:sp>
-        <p:nvSpPr>
-          <p:cNvPr id="48" name="テキスト ボックス 47"/>
-          <p:cNvSpPr txBox="1"/>
-          <p:nvPr/>
-        </p:nvSpPr>
-        <p:spPr>
-          <a:xfrm>
-            <a:off x="4263004" y="1788426"/>
-            <a:ext cx="871214" cy="369332"/>
-          </a:xfrm>
-          <a:prstGeom prst="rect">
-            <a:avLst/>
-          </a:prstGeom>
-          <a:noFill/>
-        </p:spPr>
-        <p:txBody>
-          <a:bodyPr wrap="square" rtlCol="0">
-            <a:spAutoFit/>
-          </a:bodyPr>
-          <a:lstStyle/>
-          <a:p>
-            <a:r>
-              <a:rPr lang="ja-JP" altLang="en-US" dirty="0" smtClean="0"/>
-              <a:t>④</a:t>
-            </a:r>
-            <a:endParaRPr kumimoji="1" lang="ja-JP" altLang="en-US" dirty="0"/>
-          </a:p>
-        </p:txBody>
-      </p:sp>
-      <p:sp>
-        <p:nvSpPr>
-          <p:cNvPr id="49" name="テキスト ボックス 48"/>
-          <p:cNvSpPr txBox="1"/>
-          <p:nvPr/>
-        </p:nvSpPr>
-        <p:spPr>
-          <a:xfrm>
-            <a:off x="6365782" y="1721852"/>
-            <a:ext cx="871214" cy="369332"/>
-          </a:xfrm>
-          <a:prstGeom prst="rect">
-            <a:avLst/>
-          </a:prstGeom>
-          <a:noFill/>
-        </p:spPr>
-        <p:txBody>
-          <a:bodyPr wrap="square" rtlCol="0">
-            <a:spAutoFit/>
-          </a:bodyPr>
-          <a:lstStyle/>
-          <a:p>
-            <a:r>
-              <a:rPr lang="ja-JP" altLang="en-US" dirty="0" smtClean="0"/>
-              <a:t>⑤</a:t>
-            </a:r>
-            <a:endParaRPr kumimoji="1" lang="ja-JP" altLang="en-US" dirty="0"/>
-          </a:p>
-        </p:txBody>
-      </p:sp>
-      <p:sp>
-        <p:nvSpPr>
-          <p:cNvPr id="50" name="テキスト ボックス 49"/>
-          <p:cNvSpPr txBox="1"/>
-          <p:nvPr/>
-        </p:nvSpPr>
-        <p:spPr>
-          <a:xfrm>
-            <a:off x="7222464" y="2592187"/>
-            <a:ext cx="871214" cy="369332"/>
-          </a:xfrm>
-          <a:prstGeom prst="rect">
-            <a:avLst/>
-          </a:prstGeom>
-          <a:noFill/>
-        </p:spPr>
-        <p:txBody>
-          <a:bodyPr wrap="square" rtlCol="0">
-            <a:spAutoFit/>
-          </a:bodyPr>
-          <a:lstStyle/>
-          <a:p>
-            <a:r>
-              <a:rPr lang="ja-JP" altLang="en-US" dirty="0" smtClean="0"/>
-              <a:t>⑥</a:t>
-            </a:r>
-            <a:endParaRPr kumimoji="1" lang="ja-JP" altLang="en-US" dirty="0"/>
+            <a:endParaRPr kumimoji="1" lang="ja-JP" altLang="en-US" dirty="0">
+              <a:solidFill>
+                <a:schemeClr val="tx1"/>
+              </a:solidFill>
+            </a:endParaRPr>
           </a:p>
         </p:txBody>
       </p:sp>
     </p:spTree>
     <p:extLst>
       <p:ext uri="{BB962C8B-B14F-4D97-AF65-F5344CB8AC3E}">
-        <p14:creationId xmlns:p14="http://schemas.microsoft.com/office/powerpoint/2010/main" val="3945973090"/>
+        <p14:creationId xmlns:p14="http://schemas.microsoft.com/office/powerpoint/2010/main" val="752783101"/>
       </p:ext>
     </p:extLst>
   </p:cSld>

</xml_diff>